<commit_message>
updated windows/github getting started guide
</commit_message>
<xml_diff>
--- a/Getting Started/Getting Started with Github.pptx
+++ b/Getting Started/Getting Started with Github.pptx
@@ -43,11 +43,17 @@
     <p:sldId id="297" r:id="rId37"/>
     <p:sldId id="298" r:id="rId38"/>
     <p:sldId id="299" r:id="rId39"/>
-    <p:sldId id="285" r:id="rId40"/>
-    <p:sldId id="264" r:id="rId41"/>
-    <p:sldId id="263" r:id="rId42"/>
-    <p:sldId id="280" r:id="rId43"/>
-    <p:sldId id="301" r:id="rId44"/>
+    <p:sldId id="314" r:id="rId40"/>
+    <p:sldId id="307" r:id="rId41"/>
+    <p:sldId id="308" r:id="rId42"/>
+    <p:sldId id="313" r:id="rId43"/>
+    <p:sldId id="285" r:id="rId44"/>
+    <p:sldId id="264" r:id="rId45"/>
+    <p:sldId id="263" r:id="rId46"/>
+    <p:sldId id="309" r:id="rId47"/>
+    <p:sldId id="310" r:id="rId48"/>
+    <p:sldId id="311" r:id="rId49"/>
+    <p:sldId id="312" r:id="rId50"/>
   </p:sldIdLst>
   <p:sldSz cx="9144000" cy="6858000" type="screen4x3"/>
   <p:notesSz cx="6858000" cy="9144000"/>
@@ -3160,6 +3166,10 @@
               <a:rPr lang="en-US" dirty="0" err="1" smtClean="0"/>
               <a:t>Github</a:t>
             </a:r>
+            <a:r>
+              <a:rPr lang="en-US" dirty="0" smtClean="0"/>
+              <a:t> in Windows</a:t>
+            </a:r>
             <a:endParaRPr lang="en-US" dirty="0"/>
           </a:p>
         </p:txBody>
@@ -7011,7 +7021,7 @@
         <p:spPr>
           <a:xfrm>
             <a:off x="3657600" y="5017532"/>
-            <a:ext cx="3200400" cy="369332"/>
+            <a:ext cx="3581400" cy="369332"/>
           </a:xfrm>
           <a:prstGeom prst="rect">
             <a:avLst/>
@@ -7030,7 +7040,31 @@
                   <a:schemeClr val="bg1"/>
                 </a:solidFill>
               </a:rPr>
-              <a:t>…will write over files in this one</a:t>
+              <a:t>…will </a:t>
+            </a:r>
+            <a:r>
+              <a:rPr lang="en-US" dirty="0" smtClean="0">
+                <a:solidFill>
+                  <a:schemeClr val="bg1"/>
+                </a:solidFill>
+              </a:rPr>
+              <a:t>merge with files </a:t>
+            </a:r>
+            <a:r>
+              <a:rPr lang="en-US" dirty="0" smtClean="0">
+                <a:solidFill>
+                  <a:schemeClr val="bg1"/>
+                </a:solidFill>
+              </a:rPr>
+              <a:t>in </a:t>
+            </a:r>
+            <a:r>
+              <a:rPr lang="en-US" dirty="0" smtClean="0">
+                <a:solidFill>
+                  <a:schemeClr val="bg1"/>
+                </a:solidFill>
+              </a:rPr>
+              <a:t>this one</a:t>
             </a:r>
             <a:endParaRPr lang="en-US" dirty="0">
               <a:solidFill>
@@ -7320,20 +7354,49 @@
           <a:lstStyle/>
           <a:p>
             <a:r>
-              <a:rPr lang="en-US" dirty="0" err="1" smtClean="0"/>
-              <a:t>Opensource</a:t>
-            </a:r>
-            <a:r>
               <a:rPr lang="en-US" dirty="0" smtClean="0"/>
-              <a:t> Community </a:t>
-            </a:r>
-            <a:r>
-              <a:rPr lang="en-US" dirty="0"/>
-              <a:t>S</a:t>
-            </a:r>
+              <a:t>Possible Conflicts</a:t>
+            </a:r>
+            <a:endParaRPr lang="en-US" dirty="0"/>
+          </a:p>
+        </p:txBody>
+      </p:sp>
+      <p:sp>
+        <p:nvSpPr>
+          <p:cNvPr id="3" name="Content Placeholder 2"/>
+          <p:cNvSpPr>
+            <a:spLocks noGrp="1"/>
+          </p:cNvSpPr>
+          <p:nvPr>
+            <p:ph idx="1"/>
+          </p:nvPr>
+        </p:nvSpPr>
+        <p:spPr/>
+        <p:txBody>
+          <a:bodyPr/>
+          <a:lstStyle/>
+          <a:p>
             <a:r>
               <a:rPr lang="en-US" dirty="0" smtClean="0"/>
-              <a:t>tructure</a:t>
+              <a:t>Merging 2 different versions of the same file can be tricky</a:t>
+            </a:r>
+          </a:p>
+          <a:p>
+            <a:r>
+              <a:rPr lang="en-US" dirty="0" smtClean="0"/>
+              <a:t>If the same file is modified in 2 different places no error will occur</a:t>
+            </a:r>
+          </a:p>
+          <a:p>
+            <a:r>
+              <a:rPr lang="en-US" dirty="0" smtClean="0"/>
+              <a:t>If the same files is modified in the same place in 2 different ways, an error will occur</a:t>
+            </a:r>
+          </a:p>
+          <a:p>
+            <a:r>
+              <a:rPr lang="en-US" dirty="0" smtClean="0"/>
+              <a:t>See end of slide show for more information</a:t>
             </a:r>
             <a:endParaRPr lang="en-US" dirty="0"/>
           </a:p>
@@ -7342,20 +7405,13 @@
     </p:spTree>
     <p:extLst>
       <p:ext uri="{BB962C8B-B14F-4D97-AF65-F5344CB8AC3E}">
-        <p14:creationId xmlns:p14="http://schemas.microsoft.com/office/powerpoint/2010/main" val="3411031204"/>
+        <p14:creationId xmlns:p14="http://schemas.microsoft.com/office/powerpoint/2010/main" val="2798996557"/>
       </p:ext>
     </p:extLst>
   </p:cSld>
   <p:clrMapOvr>
     <a:masterClrMapping/>
   </p:clrMapOvr>
-  <p:timing>
-    <p:tnLst>
-      <p:par>
-        <p:cTn id="1" dur="indefinite" restart="never" nodeType="tmRoot"/>
-      </p:par>
-    </p:tnLst>
-  </p:timing>
 </p:sld>
 </file>
 
@@ -7558,6 +7614,382 @@
 </file>
 
 <file path=ppt/slides/slide40.xml><?xml version="1.0" encoding="utf-8"?>
+<p:sld xmlns:a="http://schemas.openxmlformats.org/drawingml/2006/main" xmlns:r="http://schemas.openxmlformats.org/officeDocument/2006/relationships" xmlns:p="http://schemas.openxmlformats.org/presentationml/2006/main">
+  <p:cSld>
+    <p:spTree>
+      <p:nvGrpSpPr>
+        <p:cNvPr id="1" name=""/>
+        <p:cNvGrpSpPr/>
+        <p:nvPr/>
+      </p:nvGrpSpPr>
+      <p:grpSpPr>
+        <a:xfrm>
+          <a:off x="0" y="0"/>
+          <a:ext cx="0" cy="0"/>
+          <a:chOff x="0" y="0"/>
+          <a:chExt cx="0" cy="0"/>
+        </a:xfrm>
+      </p:grpSpPr>
+      <p:sp>
+        <p:nvSpPr>
+          <p:cNvPr id="2" name="Title 1"/>
+          <p:cNvSpPr>
+            <a:spLocks noGrp="1"/>
+          </p:cNvSpPr>
+          <p:nvPr>
+            <p:ph type="title"/>
+          </p:nvPr>
+        </p:nvSpPr>
+        <p:spPr/>
+        <p:txBody>
+          <a:bodyPr/>
+          <a:lstStyle/>
+          <a:p>
+            <a:r>
+              <a:rPr lang="en-US" dirty="0" smtClean="0"/>
+              <a:t>Summary</a:t>
+            </a:r>
+            <a:endParaRPr lang="en-US" dirty="0"/>
+          </a:p>
+        </p:txBody>
+      </p:sp>
+      <p:sp>
+        <p:nvSpPr>
+          <p:cNvPr id="3" name="Content Placeholder 2"/>
+          <p:cNvSpPr>
+            <a:spLocks noGrp="1"/>
+          </p:cNvSpPr>
+          <p:nvPr>
+            <p:ph idx="1"/>
+          </p:nvPr>
+        </p:nvSpPr>
+        <p:spPr/>
+        <p:txBody>
+          <a:bodyPr/>
+          <a:lstStyle/>
+          <a:p>
+            <a:r>
+              <a:rPr lang="en-US" b="1" dirty="0" smtClean="0"/>
+              <a:t>Clone</a:t>
+            </a:r>
+            <a:r>
+              <a:rPr lang="en-US" dirty="0" smtClean="0"/>
+              <a:t> – clones a repository into a local directory</a:t>
+            </a:r>
+          </a:p>
+          <a:p>
+            <a:r>
+              <a:rPr lang="en-US" b="1" dirty="0" smtClean="0"/>
+              <a:t>Commit</a:t>
+            </a:r>
+            <a:r>
+              <a:rPr lang="en-US" dirty="0" smtClean="0"/>
+              <a:t> – groups changes to local files together with a brief description; preparation for sending back to public repository</a:t>
+            </a:r>
+          </a:p>
+          <a:p>
+            <a:r>
+              <a:rPr lang="en-US" b="1" dirty="0" smtClean="0"/>
+              <a:t>Sync</a:t>
+            </a:r>
+            <a:r>
+              <a:rPr lang="en-US" dirty="0" smtClean="0"/>
+              <a:t> – pulls repository changes to existing local directory &amp; pushes a commit or a group of commits to the public repository</a:t>
+            </a:r>
+          </a:p>
+          <a:p>
+            <a:endParaRPr lang="en-US" dirty="0"/>
+          </a:p>
+        </p:txBody>
+      </p:sp>
+    </p:spTree>
+    <p:extLst>
+      <p:ext uri="{BB962C8B-B14F-4D97-AF65-F5344CB8AC3E}">
+        <p14:creationId xmlns:p14="http://schemas.microsoft.com/office/powerpoint/2010/main" val="2948036504"/>
+      </p:ext>
+    </p:extLst>
+  </p:cSld>
+  <p:clrMapOvr>
+    <a:masterClrMapping/>
+  </p:clrMapOvr>
+  <p:timing>
+    <p:tnLst>
+      <p:par>
+        <p:cTn id="1" dur="indefinite" restart="never" nodeType="tmRoot"/>
+      </p:par>
+    </p:tnLst>
+  </p:timing>
+</p:sld>
+</file>
+
+<file path=ppt/slides/slide41.xml><?xml version="1.0" encoding="utf-8"?>
+<p:sld xmlns:a="http://schemas.openxmlformats.org/drawingml/2006/main" xmlns:r="http://schemas.openxmlformats.org/officeDocument/2006/relationships" xmlns:p="http://schemas.openxmlformats.org/presentationml/2006/main">
+  <p:cSld>
+    <p:spTree>
+      <p:nvGrpSpPr>
+        <p:cNvPr id="1" name=""/>
+        <p:cNvGrpSpPr/>
+        <p:nvPr/>
+      </p:nvGrpSpPr>
+      <p:grpSpPr>
+        <a:xfrm>
+          <a:off x="0" y="0"/>
+          <a:ext cx="0" cy="0"/>
+          <a:chOff x="0" y="0"/>
+          <a:chExt cx="0" cy="0"/>
+        </a:xfrm>
+      </p:grpSpPr>
+      <p:sp>
+        <p:nvSpPr>
+          <p:cNvPr id="2" name="Title 1"/>
+          <p:cNvSpPr>
+            <a:spLocks noGrp="1"/>
+          </p:cNvSpPr>
+          <p:nvPr>
+            <p:ph type="title"/>
+          </p:nvPr>
+        </p:nvSpPr>
+        <p:spPr/>
+        <p:txBody>
+          <a:bodyPr/>
+          <a:lstStyle/>
+          <a:p>
+            <a:r>
+              <a:rPr lang="en-US" dirty="0" smtClean="0"/>
+              <a:t>Summary</a:t>
+            </a:r>
+            <a:endParaRPr lang="en-US" dirty="0"/>
+          </a:p>
+        </p:txBody>
+      </p:sp>
+      <p:sp>
+        <p:nvSpPr>
+          <p:cNvPr id="3" name="Content Placeholder 2"/>
+          <p:cNvSpPr>
+            <a:spLocks noGrp="1"/>
+          </p:cNvSpPr>
+          <p:nvPr>
+            <p:ph idx="1"/>
+          </p:nvPr>
+        </p:nvSpPr>
+        <p:spPr/>
+        <p:txBody>
+          <a:bodyPr/>
+          <a:lstStyle/>
+          <a:p>
+            <a:r>
+              <a:rPr lang="en-US" b="1" dirty="0"/>
+              <a:t>B</a:t>
+            </a:r>
+            <a:r>
+              <a:rPr lang="en-US" b="1" dirty="0" smtClean="0"/>
+              <a:t>ranch</a:t>
+            </a:r>
+            <a:r>
+              <a:rPr lang="en-US" dirty="0" smtClean="0"/>
+              <a:t> – copies an existing repository into a new branch; usually to develop a new line of thought or work out a bug fix</a:t>
+            </a:r>
+          </a:p>
+          <a:p>
+            <a:r>
+              <a:rPr lang="en-US" b="1" dirty="0" smtClean="0"/>
+              <a:t>Merge</a:t>
+            </a:r>
+            <a:r>
+              <a:rPr lang="en-US" dirty="0" smtClean="0"/>
+              <a:t> – combines two branches into one</a:t>
+            </a:r>
+            <a:endParaRPr lang="en-US" b="1" dirty="0" smtClean="0"/>
+          </a:p>
+        </p:txBody>
+      </p:sp>
+      <p:pic>
+        <p:nvPicPr>
+          <p:cNvPr id="36866" name="Picture 2" descr="https://encrypted-tbn1.gstatic.com/images?q=tbn:ANd9GcRA61O-k4NUXWQ5p-GDyeNEr6xmEes8XxH3GpB7SER9qoSrm29v"/>
+          <p:cNvPicPr>
+            <a:picLocks noChangeAspect="1" noChangeArrowheads="1"/>
+          </p:cNvPicPr>
+          <p:nvPr/>
+        </p:nvPicPr>
+        <p:blipFill>
+          <a:blip r:embed="rId2">
+            <a:extLst>
+              <a:ext uri="{28A0092B-C50C-407E-A947-70E740481C1C}">
+                <a14:useLocalDpi xmlns:a14="http://schemas.microsoft.com/office/drawing/2010/main" val="0"/>
+              </a:ext>
+            </a:extLst>
+          </a:blip>
+          <a:srcRect/>
+          <a:stretch>
+            <a:fillRect/>
+          </a:stretch>
+        </p:blipFill>
+        <p:spPr bwMode="auto">
+          <a:xfrm>
+            <a:off x="1295400" y="3990974"/>
+            <a:ext cx="6232069" cy="2181226"/>
+          </a:xfrm>
+          <a:prstGeom prst="rect">
+            <a:avLst/>
+          </a:prstGeom>
+          <a:noFill/>
+          <a:extLst>
+            <a:ext uri="{909E8E84-426E-40DD-AFC4-6F175D3DCCD1}">
+              <a14:hiddenFill xmlns:a14="http://schemas.microsoft.com/office/drawing/2010/main">
+                <a:solidFill>
+                  <a:srgbClr val="FFFFFF"/>
+                </a:solidFill>
+              </a14:hiddenFill>
+            </a:ext>
+          </a:extLst>
+        </p:spPr>
+      </p:pic>
+    </p:spTree>
+    <p:extLst>
+      <p:ext uri="{BB962C8B-B14F-4D97-AF65-F5344CB8AC3E}">
+        <p14:creationId xmlns:p14="http://schemas.microsoft.com/office/powerpoint/2010/main" val="2143687495"/>
+      </p:ext>
+    </p:extLst>
+  </p:cSld>
+  <p:clrMapOvr>
+    <a:masterClrMapping/>
+  </p:clrMapOvr>
+  <p:timing>
+    <p:tnLst>
+      <p:par>
+        <p:cTn id="1" dur="indefinite" restart="never" nodeType="tmRoot"/>
+      </p:par>
+    </p:tnLst>
+  </p:timing>
+</p:sld>
+</file>
+
+<file path=ppt/slides/slide42.xml><?xml version="1.0" encoding="utf-8"?>
+<p:sld xmlns:a="http://schemas.openxmlformats.org/drawingml/2006/main" xmlns:r="http://schemas.openxmlformats.org/officeDocument/2006/relationships" xmlns:p="http://schemas.openxmlformats.org/presentationml/2006/main">
+  <p:cSld>
+    <p:spTree>
+      <p:nvGrpSpPr>
+        <p:cNvPr id="1" name=""/>
+        <p:cNvGrpSpPr/>
+        <p:nvPr/>
+      </p:nvGrpSpPr>
+      <p:grpSpPr>
+        <a:xfrm>
+          <a:off x="0" y="0"/>
+          <a:ext cx="0" cy="0"/>
+          <a:chOff x="0" y="0"/>
+          <a:chExt cx="0" cy="0"/>
+        </a:xfrm>
+      </p:grpSpPr>
+      <p:sp>
+        <p:nvSpPr>
+          <p:cNvPr id="2" name="Title 1"/>
+          <p:cNvSpPr>
+            <a:spLocks noGrp="1"/>
+          </p:cNvSpPr>
+          <p:nvPr>
+            <p:ph type="title"/>
+          </p:nvPr>
+        </p:nvSpPr>
+        <p:spPr/>
+        <p:txBody>
+          <a:bodyPr/>
+          <a:lstStyle/>
+          <a:p>
+            <a:r>
+              <a:rPr lang="en-US" dirty="0" smtClean="0"/>
+              <a:t>FAQ</a:t>
+            </a:r>
+            <a:endParaRPr lang="en-US" dirty="0"/>
+          </a:p>
+        </p:txBody>
+      </p:sp>
+    </p:spTree>
+    <p:extLst>
+      <p:ext uri="{BB962C8B-B14F-4D97-AF65-F5344CB8AC3E}">
+        <p14:creationId xmlns:p14="http://schemas.microsoft.com/office/powerpoint/2010/main" val="1489362777"/>
+      </p:ext>
+    </p:extLst>
+  </p:cSld>
+  <p:clrMapOvr>
+    <a:masterClrMapping/>
+  </p:clrMapOvr>
+</p:sld>
+</file>
+
+<file path=ppt/slides/slide43.xml><?xml version="1.0" encoding="utf-8"?>
+<p:sld xmlns:a="http://schemas.openxmlformats.org/drawingml/2006/main" xmlns:r="http://schemas.openxmlformats.org/officeDocument/2006/relationships" xmlns:p="http://schemas.openxmlformats.org/presentationml/2006/main">
+  <p:cSld>
+    <p:spTree>
+      <p:nvGrpSpPr>
+        <p:cNvPr id="1" name=""/>
+        <p:cNvGrpSpPr/>
+        <p:nvPr/>
+      </p:nvGrpSpPr>
+      <p:grpSpPr>
+        <a:xfrm>
+          <a:off x="0" y="0"/>
+          <a:ext cx="0" cy="0"/>
+          <a:chOff x="0" y="0"/>
+          <a:chExt cx="0" cy="0"/>
+        </a:xfrm>
+      </p:grpSpPr>
+      <p:sp>
+        <p:nvSpPr>
+          <p:cNvPr id="2" name="Title 1"/>
+          <p:cNvSpPr>
+            <a:spLocks noGrp="1"/>
+          </p:cNvSpPr>
+          <p:nvPr>
+            <p:ph type="title"/>
+          </p:nvPr>
+        </p:nvSpPr>
+        <p:spPr/>
+        <p:txBody>
+          <a:bodyPr/>
+          <a:lstStyle/>
+          <a:p>
+            <a:r>
+              <a:rPr lang="en-US" dirty="0" err="1" smtClean="0"/>
+              <a:t>Opensource</a:t>
+            </a:r>
+            <a:r>
+              <a:rPr lang="en-US" dirty="0" smtClean="0"/>
+              <a:t> Community </a:t>
+            </a:r>
+            <a:r>
+              <a:rPr lang="en-US" dirty="0"/>
+              <a:t>S</a:t>
+            </a:r>
+            <a:r>
+              <a:rPr lang="en-US" dirty="0" smtClean="0"/>
+              <a:t>tructure</a:t>
+            </a:r>
+            <a:endParaRPr lang="en-US" dirty="0"/>
+          </a:p>
+        </p:txBody>
+      </p:sp>
+    </p:spTree>
+    <p:extLst>
+      <p:ext uri="{BB962C8B-B14F-4D97-AF65-F5344CB8AC3E}">
+        <p14:creationId xmlns:p14="http://schemas.microsoft.com/office/powerpoint/2010/main" val="3411031204"/>
+      </p:ext>
+    </p:extLst>
+  </p:cSld>
+  <p:clrMapOvr>
+    <a:masterClrMapping/>
+  </p:clrMapOvr>
+  <p:timing>
+    <p:tnLst>
+      <p:par>
+        <p:cTn id="1" dur="indefinite" restart="never" nodeType="tmRoot"/>
+      </p:par>
+    </p:tnLst>
+  </p:timing>
+</p:sld>
+</file>
+
+<file path=ppt/slides/slide44.xml><?xml version="1.0" encoding="utf-8"?>
 <p:sld xmlns:a="http://schemas.openxmlformats.org/drawingml/2006/main" xmlns:r="http://schemas.openxmlformats.org/officeDocument/2006/relationships" xmlns:p="http://schemas.openxmlformats.org/presentationml/2006/main">
   <p:cSld>
     <p:spTree>
@@ -8244,7 +8676,7 @@
 </p:sld>
 </file>
 
-<file path=ppt/slides/slide41.xml><?xml version="1.0" encoding="utf-8"?>
+<file path=ppt/slides/slide45.xml><?xml version="1.0" encoding="utf-8"?>
 <p:sld xmlns:a="http://schemas.openxmlformats.org/drawingml/2006/main" xmlns:r="http://schemas.openxmlformats.org/officeDocument/2006/relationships" xmlns:p="http://schemas.openxmlformats.org/presentationml/2006/main">
   <p:cSld>
     <p:spTree>
@@ -8498,7 +8930,7 @@
 </p:sld>
 </file>
 
-<file path=ppt/slides/slide42.xml><?xml version="1.0" encoding="utf-8"?>
+<file path=ppt/slides/slide46.xml><?xml version="1.0" encoding="utf-8"?>
 <p:sld xmlns:a="http://schemas.openxmlformats.org/drawingml/2006/main" xmlns:r="http://schemas.openxmlformats.org/officeDocument/2006/relationships" xmlns:p="http://schemas.openxmlformats.org/presentationml/2006/main">
   <p:cSld>
     <p:spTree>
@@ -8517,7 +8949,7 @@
       </p:grpSpPr>
       <p:sp>
         <p:nvSpPr>
-          <p:cNvPr id="2" name="Title 1"/>
+          <p:cNvPr id="4" name="Title 1"/>
           <p:cNvSpPr>
             <a:spLocks noGrp="1"/>
           </p:cNvSpPr>
@@ -8527,62 +8959,15 @@
         </p:nvSpPr>
         <p:spPr/>
         <p:txBody>
-          <a:bodyPr/>
+          <a:bodyPr>
+            <a:normAutofit fontScale="90000"/>
+          </a:bodyPr>
           <a:lstStyle/>
           <a:p>
             <a:r>
               <a:rPr lang="en-US" dirty="0" smtClean="0"/>
-              <a:t>Summary</a:t>
-            </a:r>
-            <a:endParaRPr lang="en-US" dirty="0"/>
-          </a:p>
-        </p:txBody>
-      </p:sp>
-      <p:sp>
-        <p:nvSpPr>
-          <p:cNvPr id="3" name="Content Placeholder 2"/>
-          <p:cNvSpPr>
-            <a:spLocks noGrp="1"/>
-          </p:cNvSpPr>
-          <p:nvPr>
-            <p:ph idx="1"/>
-          </p:nvPr>
-        </p:nvSpPr>
-        <p:spPr/>
-        <p:txBody>
-          <a:bodyPr/>
-          <a:lstStyle/>
-          <a:p>
-            <a:r>
-              <a:rPr lang="en-US" b="1" dirty="0" smtClean="0"/>
-              <a:t>Clone</a:t>
-            </a:r>
-            <a:r>
-              <a:rPr lang="en-US" dirty="0" smtClean="0"/>
-              <a:t> – clones a repository into a local directory</a:t>
-            </a:r>
-          </a:p>
-          <a:p>
-            <a:r>
-              <a:rPr lang="en-US" b="1" dirty="0" smtClean="0"/>
-              <a:t>Commit</a:t>
-            </a:r>
-            <a:r>
-              <a:rPr lang="en-US" dirty="0" smtClean="0"/>
-              <a:t> – groups changes to local files together with a brief description; preparation for sending back to public repository</a:t>
-            </a:r>
-          </a:p>
-          <a:p>
-            <a:r>
-              <a:rPr lang="en-US" b="1" dirty="0" smtClean="0"/>
-              <a:t>Sync</a:t>
-            </a:r>
-            <a:r>
-              <a:rPr lang="en-US" dirty="0" smtClean="0"/>
-              <a:t> – pulls repository changes to existing local directory &amp; pushes a commit or a group of commits to the public repository</a:t>
-            </a:r>
-          </a:p>
-          <a:p>
+              <a:t>When merging doesn’t go smoothly</a:t>
+            </a:r>
             <a:endParaRPr lang="en-US" dirty="0"/>
           </a:p>
         </p:txBody>
@@ -8590,24 +8975,17 @@
     </p:spTree>
     <p:extLst>
       <p:ext uri="{BB962C8B-B14F-4D97-AF65-F5344CB8AC3E}">
-        <p14:creationId xmlns:p14="http://schemas.microsoft.com/office/powerpoint/2010/main" val="1599315967"/>
+        <p14:creationId xmlns:p14="http://schemas.microsoft.com/office/powerpoint/2010/main" val="1224595891"/>
       </p:ext>
     </p:extLst>
   </p:cSld>
   <p:clrMapOvr>
     <a:masterClrMapping/>
   </p:clrMapOvr>
-  <p:timing>
-    <p:tnLst>
-      <p:par>
-        <p:cTn id="1" dur="indefinite" restart="never" nodeType="tmRoot"/>
-      </p:par>
-    </p:tnLst>
-  </p:timing>
 </p:sld>
 </file>
 
-<file path=ppt/slides/slide43.xml><?xml version="1.0" encoding="utf-8"?>
+<file path=ppt/slides/slide47.xml><?xml version="1.0" encoding="utf-8"?>
 <p:sld xmlns:a="http://schemas.openxmlformats.org/drawingml/2006/main" xmlns:r="http://schemas.openxmlformats.org/officeDocument/2006/relationships" xmlns:p="http://schemas.openxmlformats.org/presentationml/2006/main">
   <p:cSld>
     <p:spTree>
@@ -8624,73 +9002,9 @@
           <a:chExt cx="0" cy="0"/>
         </a:xfrm>
       </p:grpSpPr>
-      <p:sp>
-        <p:nvSpPr>
-          <p:cNvPr id="2" name="Title 1"/>
-          <p:cNvSpPr>
-            <a:spLocks noGrp="1"/>
-          </p:cNvSpPr>
-          <p:nvPr>
-            <p:ph type="title"/>
-          </p:nvPr>
-        </p:nvSpPr>
-        <p:spPr/>
-        <p:txBody>
-          <a:bodyPr/>
-          <a:lstStyle/>
-          <a:p>
-            <a:r>
-              <a:rPr lang="en-US" dirty="0" smtClean="0"/>
-              <a:t>Summary</a:t>
-            </a:r>
-            <a:endParaRPr lang="en-US" dirty="0"/>
-          </a:p>
-        </p:txBody>
-      </p:sp>
-      <p:sp>
-        <p:nvSpPr>
-          <p:cNvPr id="3" name="Content Placeholder 2"/>
-          <p:cNvSpPr>
-            <a:spLocks noGrp="1"/>
-          </p:cNvSpPr>
-          <p:nvPr>
-            <p:ph idx="1"/>
-          </p:nvPr>
-        </p:nvSpPr>
-        <p:spPr/>
-        <p:txBody>
-          <a:bodyPr/>
-          <a:lstStyle/>
-          <a:p>
-            <a:r>
-              <a:rPr lang="en-US" b="1" dirty="0"/>
-              <a:t>B</a:t>
-            </a:r>
-            <a:r>
-              <a:rPr lang="en-US" b="1" dirty="0" smtClean="0"/>
-              <a:t>ranch</a:t>
-            </a:r>
-            <a:r>
-              <a:rPr lang="en-US" dirty="0" smtClean="0"/>
-              <a:t> – copies an existing repository into a new branch; usually to develop a new line of thought or work out a bug fix</a:t>
-            </a:r>
-          </a:p>
-          <a:p>
-            <a:r>
-              <a:rPr lang="en-US" b="1" dirty="0" smtClean="0"/>
-              <a:t>Merge</a:t>
-            </a:r>
-            <a:r>
-              <a:rPr lang="en-US" dirty="0" smtClean="0"/>
-              <a:t> – combines two branches into one</a:t>
-            </a:r>
-            <a:endParaRPr lang="en-US" b="1" dirty="0" smtClean="0"/>
-          </a:p>
-        </p:txBody>
-      </p:sp>
       <p:pic>
         <p:nvPicPr>
-          <p:cNvPr id="36866" name="Picture 2" descr="https://encrypted-tbn1.gstatic.com/images?q=tbn:ANd9GcRA61O-k4NUXWQ5p-GDyeNEr6xmEes8XxH3GpB7SER9qoSrm29v"/>
+          <p:cNvPr id="4098" name="Picture 2"/>
           <p:cNvPicPr>
             <a:picLocks noChangeAspect="1" noChangeArrowheads="1"/>
           </p:cNvPicPr>
@@ -8711,41 +9025,1365 @@
         </p:blipFill>
         <p:spPr bwMode="auto">
           <a:xfrm>
-            <a:off x="1295400" y="3990974"/>
-            <a:ext cx="6232069" cy="2181226"/>
+            <a:off x="1504188" y="719828"/>
+            <a:ext cx="1866900" cy="1438275"/>
           </a:xfrm>
           <a:prstGeom prst="rect">
             <a:avLst/>
           </a:prstGeom>
           <a:noFill/>
+          <a:ln>
+            <a:noFill/>
+          </a:ln>
           <a:extLst>
             <a:ext uri="{909E8E84-426E-40DD-AFC4-6F175D3DCCD1}">
               <a14:hiddenFill xmlns:a14="http://schemas.microsoft.com/office/drawing/2010/main">
                 <a:solidFill>
-                  <a:srgbClr val="FFFFFF"/>
+                  <a:schemeClr val="accent1"/>
                 </a:solidFill>
               </a14:hiddenFill>
             </a:ext>
+            <a:ext uri="{91240B29-F687-4F45-9708-019B960494DF}">
+              <a14:hiddenLine xmlns:a14="http://schemas.microsoft.com/office/drawing/2010/main" w="9525">
+                <a:solidFill>
+                  <a:schemeClr val="tx1"/>
+                </a:solidFill>
+                <a:miter lim="800000"/>
+                <a:headEnd/>
+                <a:tailEnd/>
+              </a14:hiddenLine>
+            </a:ext>
           </a:extLst>
         </p:spPr>
       </p:pic>
+      <p:pic>
+        <p:nvPicPr>
+          <p:cNvPr id="4099" name="Picture 3"/>
+          <p:cNvPicPr>
+            <a:picLocks noChangeAspect="1" noChangeArrowheads="1"/>
+          </p:cNvPicPr>
+          <p:nvPr/>
+        </p:nvPicPr>
+        <p:blipFill>
+          <a:blip r:embed="rId3">
+            <a:extLst>
+              <a:ext uri="{28A0092B-C50C-407E-A947-70E740481C1C}">
+                <a14:useLocalDpi xmlns:a14="http://schemas.microsoft.com/office/drawing/2010/main" val="0"/>
+              </a:ext>
+            </a:extLst>
+          </a:blip>
+          <a:srcRect/>
+          <a:stretch>
+            <a:fillRect/>
+          </a:stretch>
+        </p:blipFill>
+        <p:spPr bwMode="auto">
+          <a:xfrm>
+            <a:off x="5514975" y="2828925"/>
+            <a:ext cx="1876425" cy="1438275"/>
+          </a:xfrm>
+          <a:prstGeom prst="rect">
+            <a:avLst/>
+          </a:prstGeom>
+          <a:noFill/>
+          <a:ln>
+            <a:noFill/>
+          </a:ln>
+          <a:extLst>
+            <a:ext uri="{909E8E84-426E-40DD-AFC4-6F175D3DCCD1}">
+              <a14:hiddenFill xmlns:a14="http://schemas.microsoft.com/office/drawing/2010/main">
+                <a:solidFill>
+                  <a:schemeClr val="accent1"/>
+                </a:solidFill>
+              </a14:hiddenFill>
+            </a:ext>
+            <a:ext uri="{91240B29-F687-4F45-9708-019B960494DF}">
+              <a14:hiddenLine xmlns:a14="http://schemas.microsoft.com/office/drawing/2010/main" w="9525">
+                <a:solidFill>
+                  <a:schemeClr val="tx1"/>
+                </a:solidFill>
+                <a:miter lim="800000"/>
+                <a:headEnd/>
+                <a:tailEnd/>
+              </a14:hiddenLine>
+            </a:ext>
+          </a:extLst>
+        </p:spPr>
+      </p:pic>
+      <p:pic>
+        <p:nvPicPr>
+          <p:cNvPr id="4100" name="Picture 4"/>
+          <p:cNvPicPr>
+            <a:picLocks noChangeAspect="1" noChangeArrowheads="1"/>
+          </p:cNvPicPr>
+          <p:nvPr/>
+        </p:nvPicPr>
+        <p:blipFill>
+          <a:blip r:embed="rId4">
+            <a:extLst>
+              <a:ext uri="{28A0092B-C50C-407E-A947-70E740481C1C}">
+                <a14:useLocalDpi xmlns:a14="http://schemas.microsoft.com/office/drawing/2010/main" val="0"/>
+              </a:ext>
+            </a:extLst>
+          </a:blip>
+          <a:srcRect/>
+          <a:stretch>
+            <a:fillRect/>
+          </a:stretch>
+        </p:blipFill>
+        <p:spPr bwMode="auto">
+          <a:xfrm>
+            <a:off x="1371600" y="2819400"/>
+            <a:ext cx="1885950" cy="1419225"/>
+          </a:xfrm>
+          <a:prstGeom prst="rect">
+            <a:avLst/>
+          </a:prstGeom>
+          <a:noFill/>
+          <a:ln>
+            <a:noFill/>
+          </a:ln>
+          <a:extLst>
+            <a:ext uri="{909E8E84-426E-40DD-AFC4-6F175D3DCCD1}">
+              <a14:hiddenFill xmlns:a14="http://schemas.microsoft.com/office/drawing/2010/main">
+                <a:solidFill>
+                  <a:schemeClr val="accent1"/>
+                </a:solidFill>
+              </a14:hiddenFill>
+            </a:ext>
+            <a:ext uri="{91240B29-F687-4F45-9708-019B960494DF}">
+              <a14:hiddenLine xmlns:a14="http://schemas.microsoft.com/office/drawing/2010/main" w="9525">
+                <a:solidFill>
+                  <a:schemeClr val="tx1"/>
+                </a:solidFill>
+                <a:miter lim="800000"/>
+                <a:headEnd/>
+                <a:tailEnd/>
+              </a14:hiddenLine>
+            </a:ext>
+          </a:extLst>
+        </p:spPr>
+      </p:pic>
+      <p:cxnSp>
+        <p:nvCxnSpPr>
+          <p:cNvPr id="5" name="Straight Arrow Connector 4"/>
+          <p:cNvCxnSpPr/>
+          <p:nvPr/>
+        </p:nvCxnSpPr>
+        <p:spPr>
+          <a:xfrm>
+            <a:off x="2552700" y="2272284"/>
+            <a:ext cx="0" cy="381000"/>
+          </a:xfrm>
+          <a:prstGeom prst="straightConnector1">
+            <a:avLst/>
+          </a:prstGeom>
+          <a:ln w="38100">
+            <a:tailEnd type="arrow"/>
+          </a:ln>
+        </p:spPr>
+        <p:style>
+          <a:lnRef idx="1">
+            <a:schemeClr val="accent1"/>
+          </a:lnRef>
+          <a:fillRef idx="0">
+            <a:schemeClr val="accent1"/>
+          </a:fillRef>
+          <a:effectRef idx="0">
+            <a:schemeClr val="accent1"/>
+          </a:effectRef>
+          <a:fontRef idx="minor">
+            <a:schemeClr val="tx1"/>
+          </a:fontRef>
+        </p:style>
+      </p:cxnSp>
+      <p:cxnSp>
+        <p:nvCxnSpPr>
+          <p:cNvPr id="9" name="Straight Arrow Connector 8"/>
+          <p:cNvCxnSpPr/>
+          <p:nvPr/>
+        </p:nvCxnSpPr>
+        <p:spPr>
+          <a:xfrm>
+            <a:off x="3599307" y="4419600"/>
+            <a:ext cx="381000" cy="381000"/>
+          </a:xfrm>
+          <a:prstGeom prst="straightConnector1">
+            <a:avLst/>
+          </a:prstGeom>
+          <a:ln w="38100">
+            <a:tailEnd type="arrow"/>
+          </a:ln>
+        </p:spPr>
+        <p:style>
+          <a:lnRef idx="1">
+            <a:schemeClr val="accent1"/>
+          </a:lnRef>
+          <a:fillRef idx="0">
+            <a:schemeClr val="accent1"/>
+          </a:fillRef>
+          <a:effectRef idx="0">
+            <a:schemeClr val="accent1"/>
+          </a:effectRef>
+          <a:fontRef idx="minor">
+            <a:schemeClr val="tx1"/>
+          </a:fontRef>
+        </p:style>
+      </p:cxnSp>
+      <p:sp>
+        <p:nvSpPr>
+          <p:cNvPr id="7" name="TextBox 6"/>
+          <p:cNvSpPr txBox="1"/>
+          <p:nvPr/>
+        </p:nvSpPr>
+        <p:spPr>
+          <a:xfrm>
+            <a:off x="304800" y="1254300"/>
+            <a:ext cx="1295400" cy="646331"/>
+          </a:xfrm>
+          <a:prstGeom prst="rect">
+            <a:avLst/>
+          </a:prstGeom>
+          <a:noFill/>
+        </p:spPr>
+        <p:txBody>
+          <a:bodyPr wrap="square" rtlCol="0">
+            <a:spAutoFit/>
+          </a:bodyPr>
+          <a:lstStyle/>
+          <a:p>
+            <a:r>
+              <a:rPr lang="en-US" dirty="0" smtClean="0"/>
+              <a:t>Branch</a:t>
+            </a:r>
+          </a:p>
+          <a:p>
+            <a:r>
+              <a:rPr lang="en-US" dirty="0" smtClean="0"/>
+              <a:t>“master”</a:t>
+            </a:r>
+            <a:endParaRPr lang="en-US" dirty="0"/>
+          </a:p>
+        </p:txBody>
+      </p:sp>
+      <p:pic>
+        <p:nvPicPr>
+          <p:cNvPr id="13" name="Picture 2"/>
+          <p:cNvPicPr>
+            <a:picLocks noChangeAspect="1" noChangeArrowheads="1"/>
+          </p:cNvPicPr>
+          <p:nvPr/>
+        </p:nvPicPr>
+        <p:blipFill>
+          <a:blip r:embed="rId2">
+            <a:extLst>
+              <a:ext uri="{28A0092B-C50C-407E-A947-70E740481C1C}">
+                <a14:useLocalDpi xmlns:a14="http://schemas.microsoft.com/office/drawing/2010/main" val="0"/>
+              </a:ext>
+            </a:extLst>
+          </a:blip>
+          <a:srcRect/>
+          <a:stretch>
+            <a:fillRect/>
+          </a:stretch>
+        </p:blipFill>
+        <p:spPr bwMode="auto">
+          <a:xfrm>
+            <a:off x="5143500" y="753237"/>
+            <a:ext cx="1866900" cy="1438275"/>
+          </a:xfrm>
+          <a:prstGeom prst="rect">
+            <a:avLst/>
+          </a:prstGeom>
+          <a:noFill/>
+          <a:ln>
+            <a:noFill/>
+          </a:ln>
+          <a:extLst>
+            <a:ext uri="{909E8E84-426E-40DD-AFC4-6F175D3DCCD1}">
+              <a14:hiddenFill xmlns:a14="http://schemas.microsoft.com/office/drawing/2010/main">
+                <a:solidFill>
+                  <a:schemeClr val="accent1"/>
+                </a:solidFill>
+              </a14:hiddenFill>
+            </a:ext>
+            <a:ext uri="{91240B29-F687-4F45-9708-019B960494DF}">
+              <a14:hiddenLine xmlns:a14="http://schemas.microsoft.com/office/drawing/2010/main" w="9525">
+                <a:solidFill>
+                  <a:schemeClr val="tx1"/>
+                </a:solidFill>
+                <a:miter lim="800000"/>
+                <a:headEnd/>
+                <a:tailEnd/>
+              </a14:hiddenLine>
+            </a:ext>
+          </a:extLst>
+        </p:spPr>
+      </p:pic>
+      <p:sp>
+        <p:nvSpPr>
+          <p:cNvPr id="11" name="Curved Down Arrow 10"/>
+          <p:cNvSpPr/>
+          <p:nvPr/>
+        </p:nvSpPr>
+        <p:spPr>
+          <a:xfrm>
+            <a:off x="3599307" y="533400"/>
+            <a:ext cx="1428750" cy="609600"/>
+          </a:xfrm>
+          <a:prstGeom prst="curvedDownArrow">
+            <a:avLst/>
+          </a:prstGeom>
+          <a:solidFill>
+            <a:srgbClr val="FF0000"/>
+          </a:solidFill>
+          <a:ln>
+            <a:noFill/>
+          </a:ln>
+        </p:spPr>
+        <p:style>
+          <a:lnRef idx="2">
+            <a:schemeClr val="accent1">
+              <a:shade val="50000"/>
+            </a:schemeClr>
+          </a:lnRef>
+          <a:fillRef idx="1">
+            <a:schemeClr val="accent1"/>
+          </a:fillRef>
+          <a:effectRef idx="0">
+            <a:schemeClr val="accent1"/>
+          </a:effectRef>
+          <a:fontRef idx="minor">
+            <a:schemeClr val="lt1"/>
+          </a:fontRef>
+        </p:style>
+        <p:txBody>
+          <a:bodyPr rtlCol="0" anchor="ctr"/>
+          <a:lstStyle/>
+          <a:p>
+            <a:pPr algn="ctr"/>
+            <a:endParaRPr lang="en-US">
+              <a:solidFill>
+                <a:srgbClr val="FF0000"/>
+              </a:solidFill>
+            </a:endParaRPr>
+          </a:p>
+        </p:txBody>
+      </p:sp>
+      <p:sp>
+        <p:nvSpPr>
+          <p:cNvPr id="17" name="TextBox 16"/>
+          <p:cNvSpPr txBox="1"/>
+          <p:nvPr/>
+        </p:nvSpPr>
+        <p:spPr>
+          <a:xfrm>
+            <a:off x="7239000" y="1115799"/>
+            <a:ext cx="1295400" cy="646331"/>
+          </a:xfrm>
+          <a:prstGeom prst="rect">
+            <a:avLst/>
+          </a:prstGeom>
+          <a:noFill/>
+        </p:spPr>
+        <p:txBody>
+          <a:bodyPr wrap="square" rtlCol="0">
+            <a:spAutoFit/>
+          </a:bodyPr>
+          <a:lstStyle/>
+          <a:p>
+            <a:r>
+              <a:rPr lang="en-US" dirty="0" smtClean="0"/>
+              <a:t>Branch</a:t>
+            </a:r>
+          </a:p>
+          <a:p>
+            <a:r>
+              <a:rPr lang="en-US" dirty="0" smtClean="0"/>
+              <a:t>“test”</a:t>
+            </a:r>
+            <a:endParaRPr lang="en-US" dirty="0"/>
+          </a:p>
+        </p:txBody>
+      </p:sp>
+      <p:sp>
+        <p:nvSpPr>
+          <p:cNvPr id="19" name="TextBox 18"/>
+          <p:cNvSpPr txBox="1"/>
+          <p:nvPr/>
+        </p:nvSpPr>
+        <p:spPr>
+          <a:xfrm>
+            <a:off x="3599307" y="76200"/>
+            <a:ext cx="1544193" cy="369332"/>
+          </a:xfrm>
+          <a:prstGeom prst="rect">
+            <a:avLst/>
+          </a:prstGeom>
+          <a:noFill/>
+        </p:spPr>
+        <p:txBody>
+          <a:bodyPr wrap="square" rtlCol="0">
+            <a:spAutoFit/>
+          </a:bodyPr>
+          <a:lstStyle/>
+          <a:p>
+            <a:r>
+              <a:rPr lang="en-US" dirty="0" smtClean="0"/>
+              <a:t>New branch</a:t>
+            </a:r>
+            <a:endParaRPr lang="en-US" dirty="0"/>
+          </a:p>
+        </p:txBody>
+      </p:sp>
+      <p:cxnSp>
+        <p:nvCxnSpPr>
+          <p:cNvPr id="20" name="Straight Arrow Connector 19"/>
+          <p:cNvCxnSpPr/>
+          <p:nvPr/>
+        </p:nvCxnSpPr>
+        <p:spPr>
+          <a:xfrm flipH="1">
+            <a:off x="4953000" y="4419600"/>
+            <a:ext cx="381000" cy="381000"/>
+          </a:xfrm>
+          <a:prstGeom prst="straightConnector1">
+            <a:avLst/>
+          </a:prstGeom>
+          <a:ln w="38100">
+            <a:tailEnd type="arrow"/>
+          </a:ln>
+        </p:spPr>
+        <p:style>
+          <a:lnRef idx="1">
+            <a:schemeClr val="accent1"/>
+          </a:lnRef>
+          <a:fillRef idx="0">
+            <a:schemeClr val="accent1"/>
+          </a:fillRef>
+          <a:effectRef idx="0">
+            <a:schemeClr val="accent1"/>
+          </a:effectRef>
+          <a:fontRef idx="minor">
+            <a:schemeClr val="tx1"/>
+          </a:fontRef>
+        </p:style>
+      </p:cxnSp>
+      <p:sp>
+        <p:nvSpPr>
+          <p:cNvPr id="15" name="Rectangle 14"/>
+          <p:cNvSpPr/>
+          <p:nvPr/>
+        </p:nvSpPr>
+        <p:spPr>
+          <a:xfrm>
+            <a:off x="4316159" y="4953000"/>
+            <a:ext cx="511679" cy="923330"/>
+          </a:xfrm>
+          <a:prstGeom prst="rect">
+            <a:avLst/>
+          </a:prstGeom>
+          <a:noFill/>
+        </p:spPr>
+        <p:txBody>
+          <a:bodyPr wrap="none" lIns="91440" tIns="45720" rIns="91440" bIns="45720">
+            <a:spAutoFit/>
+            <a:scene3d>
+              <a:camera prst="orthographicFront"/>
+              <a:lightRig rig="soft" dir="tl">
+                <a:rot lat="0" lon="0" rev="0"/>
+              </a:lightRig>
+            </a:scene3d>
+            <a:sp3d contourW="25400" prstMaterial="matte">
+              <a:bevelT w="25400" h="55880" prst="artDeco"/>
+              <a:contourClr>
+                <a:schemeClr val="accent2">
+                  <a:tint val="20000"/>
+                </a:schemeClr>
+              </a:contourClr>
+            </a:sp3d>
+          </a:bodyPr>
+          <a:lstStyle/>
+          <a:p>
+            <a:pPr algn="ctr"/>
+            <a:r>
+              <a:rPr lang="en-US" sz="5400" b="1" cap="none" spc="50" dirty="0" smtClean="0">
+                <a:ln w="11430"/>
+                <a:gradFill>
+                  <a:gsLst>
+                    <a:gs pos="25000">
+                      <a:schemeClr val="accent2">
+                        <a:satMod val="155000"/>
+                      </a:schemeClr>
+                    </a:gs>
+                    <a:gs pos="100000">
+                      <a:schemeClr val="accent2">
+                        <a:shade val="45000"/>
+                        <a:satMod val="165000"/>
+                      </a:schemeClr>
+                    </a:gs>
+                  </a:gsLst>
+                  <a:lin ang="5400000"/>
+                </a:gradFill>
+                <a:effectLst>
+                  <a:outerShdw blurRad="76200" dist="50800" dir="5400000" algn="tl" rotWithShape="0">
+                    <a:srgbClr val="000000">
+                      <a:alpha val="65000"/>
+                    </a:srgbClr>
+                  </a:outerShdw>
+                </a:effectLst>
+              </a:rPr>
+              <a:t>?</a:t>
+            </a:r>
+            <a:endParaRPr lang="en-US" sz="5400" b="1" cap="none" spc="50" dirty="0">
+              <a:ln w="11430"/>
+              <a:gradFill>
+                <a:gsLst>
+                  <a:gs pos="25000">
+                    <a:schemeClr val="accent2">
+                      <a:satMod val="155000"/>
+                    </a:schemeClr>
+                  </a:gs>
+                  <a:gs pos="100000">
+                    <a:schemeClr val="accent2">
+                      <a:shade val="45000"/>
+                      <a:satMod val="165000"/>
+                    </a:schemeClr>
+                  </a:gs>
+                </a:gsLst>
+                <a:lin ang="5400000"/>
+              </a:gradFill>
+              <a:effectLst>
+                <a:outerShdw blurRad="76200" dist="50800" dir="5400000" algn="tl" rotWithShape="0">
+                  <a:srgbClr val="000000">
+                    <a:alpha val="65000"/>
+                  </a:srgbClr>
+                </a:outerShdw>
+              </a:effectLst>
+            </a:endParaRPr>
+          </a:p>
+        </p:txBody>
+      </p:sp>
+      <p:cxnSp>
+        <p:nvCxnSpPr>
+          <p:cNvPr id="22" name="Straight Arrow Connector 21"/>
+          <p:cNvCxnSpPr/>
+          <p:nvPr/>
+        </p:nvCxnSpPr>
+        <p:spPr>
+          <a:xfrm>
+            <a:off x="6067806" y="2272284"/>
+            <a:ext cx="0" cy="394716"/>
+          </a:xfrm>
+          <a:prstGeom prst="straightConnector1">
+            <a:avLst/>
+          </a:prstGeom>
+          <a:ln w="38100">
+            <a:tailEnd type="arrow"/>
+          </a:ln>
+        </p:spPr>
+        <p:style>
+          <a:lnRef idx="1">
+            <a:schemeClr val="accent1"/>
+          </a:lnRef>
+          <a:fillRef idx="0">
+            <a:schemeClr val="accent1"/>
+          </a:fillRef>
+          <a:effectRef idx="0">
+            <a:schemeClr val="accent1"/>
+          </a:effectRef>
+          <a:fontRef idx="minor">
+            <a:schemeClr val="tx1"/>
+          </a:fontRef>
+        </p:style>
+      </p:cxnSp>
+      <p:sp>
+        <p:nvSpPr>
+          <p:cNvPr id="25" name="TextBox 24"/>
+          <p:cNvSpPr txBox="1"/>
+          <p:nvPr/>
+        </p:nvSpPr>
+        <p:spPr>
+          <a:xfrm>
+            <a:off x="3124199" y="6019800"/>
+            <a:ext cx="3328987" cy="369332"/>
+          </a:xfrm>
+          <a:prstGeom prst="rect">
+            <a:avLst/>
+          </a:prstGeom>
+          <a:noFill/>
+        </p:spPr>
+        <p:txBody>
+          <a:bodyPr wrap="square" rtlCol="0">
+            <a:spAutoFit/>
+          </a:bodyPr>
+          <a:lstStyle/>
+          <a:p>
+            <a:r>
+              <a:rPr lang="en-US" dirty="0" smtClean="0"/>
+              <a:t>What happens when I merge?</a:t>
+            </a:r>
+            <a:endParaRPr lang="en-US" dirty="0"/>
+          </a:p>
+        </p:txBody>
+      </p:sp>
     </p:spTree>
     <p:extLst>
       <p:ext uri="{BB962C8B-B14F-4D97-AF65-F5344CB8AC3E}">
-        <p14:creationId xmlns:p14="http://schemas.microsoft.com/office/powerpoint/2010/main" val="598849466"/>
+        <p14:creationId xmlns:p14="http://schemas.microsoft.com/office/powerpoint/2010/main" val="1683895320"/>
       </p:ext>
     </p:extLst>
   </p:cSld>
   <p:clrMapOvr>
     <a:masterClrMapping/>
   </p:clrMapOvr>
-  <p:timing>
-    <p:tnLst>
-      <p:par>
-        <p:cTn id="1" dur="indefinite" restart="never" nodeType="tmRoot"/>
-      </p:par>
-    </p:tnLst>
-  </p:timing>
+</p:sld>
+</file>
+
+<file path=ppt/slides/slide48.xml><?xml version="1.0" encoding="utf-8"?>
+<p:sld xmlns:a="http://schemas.openxmlformats.org/drawingml/2006/main" xmlns:r="http://schemas.openxmlformats.org/officeDocument/2006/relationships" xmlns:p="http://schemas.openxmlformats.org/presentationml/2006/main">
+  <p:cSld>
+    <p:spTree>
+      <p:nvGrpSpPr>
+        <p:cNvPr id="1" name=""/>
+        <p:cNvGrpSpPr/>
+        <p:nvPr/>
+      </p:nvGrpSpPr>
+      <p:grpSpPr>
+        <a:xfrm>
+          <a:off x="0" y="0"/>
+          <a:ext cx="0" cy="0"/>
+          <a:chOff x="0" y="0"/>
+          <a:chExt cx="0" cy="0"/>
+        </a:xfrm>
+      </p:grpSpPr>
+      <p:pic>
+        <p:nvPicPr>
+          <p:cNvPr id="3074" name="Picture 2"/>
+          <p:cNvPicPr>
+            <a:picLocks noChangeAspect="1" noChangeArrowheads="1"/>
+          </p:cNvPicPr>
+          <p:nvPr/>
+        </p:nvPicPr>
+        <p:blipFill>
+          <a:blip r:embed="rId2">
+            <a:extLst>
+              <a:ext uri="{28A0092B-C50C-407E-A947-70E740481C1C}">
+                <a14:useLocalDpi xmlns:a14="http://schemas.microsoft.com/office/drawing/2010/main" val="0"/>
+              </a:ext>
+            </a:extLst>
+          </a:blip>
+          <a:srcRect/>
+          <a:stretch>
+            <a:fillRect/>
+          </a:stretch>
+        </p:blipFill>
+        <p:spPr bwMode="auto">
+          <a:xfrm>
+            <a:off x="71438" y="223838"/>
+            <a:ext cx="9001125" cy="6410325"/>
+          </a:xfrm>
+          <a:prstGeom prst="rect">
+            <a:avLst/>
+          </a:prstGeom>
+          <a:noFill/>
+          <a:ln>
+            <a:noFill/>
+          </a:ln>
+          <a:extLst>
+            <a:ext uri="{909E8E84-426E-40DD-AFC4-6F175D3DCCD1}">
+              <a14:hiddenFill xmlns:a14="http://schemas.microsoft.com/office/drawing/2010/main">
+                <a:solidFill>
+                  <a:schemeClr val="accent1"/>
+                </a:solidFill>
+              </a14:hiddenFill>
+            </a:ext>
+            <a:ext uri="{91240B29-F687-4F45-9708-019B960494DF}">
+              <a14:hiddenLine xmlns:a14="http://schemas.microsoft.com/office/drawing/2010/main" w="9525">
+                <a:solidFill>
+                  <a:schemeClr val="tx1"/>
+                </a:solidFill>
+                <a:miter lim="800000"/>
+                <a:headEnd/>
+                <a:tailEnd/>
+              </a14:hiddenLine>
+            </a:ext>
+          </a:extLst>
+        </p:spPr>
+      </p:pic>
+      <p:sp>
+        <p:nvSpPr>
+          <p:cNvPr id="4" name="TextBox 3"/>
+          <p:cNvSpPr txBox="1"/>
+          <p:nvPr/>
+        </p:nvSpPr>
+        <p:spPr>
+          <a:xfrm>
+            <a:off x="3352800" y="4191000"/>
+            <a:ext cx="5334000" cy="923330"/>
+          </a:xfrm>
+          <a:prstGeom prst="rect">
+            <a:avLst/>
+          </a:prstGeom>
+          <a:noFill/>
+        </p:spPr>
+        <p:txBody>
+          <a:bodyPr wrap="square" rtlCol="0">
+            <a:spAutoFit/>
+          </a:bodyPr>
+          <a:lstStyle/>
+          <a:p>
+            <a:r>
+              <a:rPr lang="en-US" dirty="0" smtClean="0"/>
+              <a:t>Requires command line interface to solve</a:t>
+            </a:r>
+          </a:p>
+          <a:p>
+            <a:r>
+              <a:rPr lang="en-US" dirty="0">
+                <a:hlinkClick r:id="rId3"/>
+              </a:rPr>
+              <a:t>http://git-scm.com/book/en/Git-Branching-Basic-Branching-and-Merging</a:t>
+            </a:r>
+            <a:endParaRPr lang="en-US" dirty="0"/>
+          </a:p>
+        </p:txBody>
+      </p:sp>
+    </p:spTree>
+    <p:extLst>
+      <p:ext uri="{BB962C8B-B14F-4D97-AF65-F5344CB8AC3E}">
+        <p14:creationId xmlns:p14="http://schemas.microsoft.com/office/powerpoint/2010/main" val="1536166240"/>
+      </p:ext>
+    </p:extLst>
+  </p:cSld>
+  <p:clrMapOvr>
+    <a:masterClrMapping/>
+  </p:clrMapOvr>
+</p:sld>
+</file>
+
+<file path=ppt/slides/slide49.xml><?xml version="1.0" encoding="utf-8"?>
+<p:sld xmlns:a="http://schemas.openxmlformats.org/drawingml/2006/main" xmlns:r="http://schemas.openxmlformats.org/officeDocument/2006/relationships" xmlns:p="http://schemas.openxmlformats.org/presentationml/2006/main">
+  <p:cSld>
+    <p:spTree>
+      <p:nvGrpSpPr>
+        <p:cNvPr id="1" name=""/>
+        <p:cNvGrpSpPr/>
+        <p:nvPr/>
+      </p:nvGrpSpPr>
+      <p:grpSpPr>
+        <a:xfrm>
+          <a:off x="0" y="0"/>
+          <a:ext cx="0" cy="0"/>
+          <a:chOff x="0" y="0"/>
+          <a:chExt cx="0" cy="0"/>
+        </a:xfrm>
+      </p:grpSpPr>
+      <p:pic>
+        <p:nvPicPr>
+          <p:cNvPr id="4098" name="Picture 2"/>
+          <p:cNvPicPr>
+            <a:picLocks noChangeAspect="1" noChangeArrowheads="1"/>
+          </p:cNvPicPr>
+          <p:nvPr/>
+        </p:nvPicPr>
+        <p:blipFill>
+          <a:blip r:embed="rId2">
+            <a:extLst>
+              <a:ext uri="{28A0092B-C50C-407E-A947-70E740481C1C}">
+                <a14:useLocalDpi xmlns:a14="http://schemas.microsoft.com/office/drawing/2010/main" val="0"/>
+              </a:ext>
+            </a:extLst>
+          </a:blip>
+          <a:srcRect/>
+          <a:stretch>
+            <a:fillRect/>
+          </a:stretch>
+        </p:blipFill>
+        <p:spPr bwMode="auto">
+          <a:xfrm>
+            <a:off x="1504188" y="719828"/>
+            <a:ext cx="1866900" cy="1438275"/>
+          </a:xfrm>
+          <a:prstGeom prst="rect">
+            <a:avLst/>
+          </a:prstGeom>
+          <a:noFill/>
+          <a:ln>
+            <a:noFill/>
+          </a:ln>
+          <a:extLst>
+            <a:ext uri="{909E8E84-426E-40DD-AFC4-6F175D3DCCD1}">
+              <a14:hiddenFill xmlns:a14="http://schemas.microsoft.com/office/drawing/2010/main">
+                <a:solidFill>
+                  <a:schemeClr val="accent1"/>
+                </a:solidFill>
+              </a14:hiddenFill>
+            </a:ext>
+            <a:ext uri="{91240B29-F687-4F45-9708-019B960494DF}">
+              <a14:hiddenLine xmlns:a14="http://schemas.microsoft.com/office/drawing/2010/main" w="9525">
+                <a:solidFill>
+                  <a:schemeClr val="tx1"/>
+                </a:solidFill>
+                <a:miter lim="800000"/>
+                <a:headEnd/>
+                <a:tailEnd/>
+              </a14:hiddenLine>
+            </a:ext>
+          </a:extLst>
+        </p:spPr>
+      </p:pic>
+      <p:pic>
+        <p:nvPicPr>
+          <p:cNvPr id="4099" name="Picture 3"/>
+          <p:cNvPicPr>
+            <a:picLocks noChangeAspect="1" noChangeArrowheads="1"/>
+          </p:cNvPicPr>
+          <p:nvPr/>
+        </p:nvPicPr>
+        <p:blipFill>
+          <a:blip r:embed="rId3">
+            <a:extLst>
+              <a:ext uri="{28A0092B-C50C-407E-A947-70E740481C1C}">
+                <a14:useLocalDpi xmlns:a14="http://schemas.microsoft.com/office/drawing/2010/main" val="0"/>
+              </a:ext>
+            </a:extLst>
+          </a:blip>
+          <a:srcRect/>
+          <a:stretch>
+            <a:fillRect/>
+          </a:stretch>
+        </p:blipFill>
+        <p:spPr bwMode="auto">
+          <a:xfrm>
+            <a:off x="5514975" y="2828925"/>
+            <a:ext cx="1876425" cy="1438275"/>
+          </a:xfrm>
+          <a:prstGeom prst="rect">
+            <a:avLst/>
+          </a:prstGeom>
+          <a:noFill/>
+          <a:ln>
+            <a:noFill/>
+          </a:ln>
+          <a:extLst>
+            <a:ext uri="{909E8E84-426E-40DD-AFC4-6F175D3DCCD1}">
+              <a14:hiddenFill xmlns:a14="http://schemas.microsoft.com/office/drawing/2010/main">
+                <a:solidFill>
+                  <a:schemeClr val="accent1"/>
+                </a:solidFill>
+              </a14:hiddenFill>
+            </a:ext>
+            <a:ext uri="{91240B29-F687-4F45-9708-019B960494DF}">
+              <a14:hiddenLine xmlns:a14="http://schemas.microsoft.com/office/drawing/2010/main" w="9525">
+                <a:solidFill>
+                  <a:schemeClr val="tx1"/>
+                </a:solidFill>
+                <a:miter lim="800000"/>
+                <a:headEnd/>
+                <a:tailEnd/>
+              </a14:hiddenLine>
+            </a:ext>
+          </a:extLst>
+        </p:spPr>
+      </p:pic>
+      <p:pic>
+        <p:nvPicPr>
+          <p:cNvPr id="4100" name="Picture 4"/>
+          <p:cNvPicPr>
+            <a:picLocks noChangeAspect="1" noChangeArrowheads="1"/>
+          </p:cNvPicPr>
+          <p:nvPr/>
+        </p:nvPicPr>
+        <p:blipFill>
+          <a:blip r:embed="rId4">
+            <a:extLst>
+              <a:ext uri="{28A0092B-C50C-407E-A947-70E740481C1C}">
+                <a14:useLocalDpi xmlns:a14="http://schemas.microsoft.com/office/drawing/2010/main" val="0"/>
+              </a:ext>
+            </a:extLst>
+          </a:blip>
+          <a:srcRect/>
+          <a:stretch>
+            <a:fillRect/>
+          </a:stretch>
+        </p:blipFill>
+        <p:spPr bwMode="auto">
+          <a:xfrm>
+            <a:off x="1371600" y="2819400"/>
+            <a:ext cx="1885950" cy="1419225"/>
+          </a:xfrm>
+          <a:prstGeom prst="rect">
+            <a:avLst/>
+          </a:prstGeom>
+          <a:noFill/>
+          <a:ln>
+            <a:noFill/>
+          </a:ln>
+          <a:extLst>
+            <a:ext uri="{909E8E84-426E-40DD-AFC4-6F175D3DCCD1}">
+              <a14:hiddenFill xmlns:a14="http://schemas.microsoft.com/office/drawing/2010/main">
+                <a:solidFill>
+                  <a:schemeClr val="accent1"/>
+                </a:solidFill>
+              </a14:hiddenFill>
+            </a:ext>
+            <a:ext uri="{91240B29-F687-4F45-9708-019B960494DF}">
+              <a14:hiddenLine xmlns:a14="http://schemas.microsoft.com/office/drawing/2010/main" w="9525">
+                <a:solidFill>
+                  <a:schemeClr val="tx1"/>
+                </a:solidFill>
+                <a:miter lim="800000"/>
+                <a:headEnd/>
+                <a:tailEnd/>
+              </a14:hiddenLine>
+            </a:ext>
+          </a:extLst>
+        </p:spPr>
+      </p:pic>
+      <p:cxnSp>
+        <p:nvCxnSpPr>
+          <p:cNvPr id="5" name="Straight Arrow Connector 4"/>
+          <p:cNvCxnSpPr/>
+          <p:nvPr/>
+        </p:nvCxnSpPr>
+        <p:spPr>
+          <a:xfrm>
+            <a:off x="2552700" y="2272284"/>
+            <a:ext cx="0" cy="381000"/>
+          </a:xfrm>
+          <a:prstGeom prst="straightConnector1">
+            <a:avLst/>
+          </a:prstGeom>
+          <a:ln w="38100">
+            <a:tailEnd type="arrow"/>
+          </a:ln>
+        </p:spPr>
+        <p:style>
+          <a:lnRef idx="1">
+            <a:schemeClr val="accent1"/>
+          </a:lnRef>
+          <a:fillRef idx="0">
+            <a:schemeClr val="accent1"/>
+          </a:fillRef>
+          <a:effectRef idx="0">
+            <a:schemeClr val="accent1"/>
+          </a:effectRef>
+          <a:fontRef idx="minor">
+            <a:schemeClr val="tx1"/>
+          </a:fontRef>
+        </p:style>
+      </p:cxnSp>
+      <p:cxnSp>
+        <p:nvCxnSpPr>
+          <p:cNvPr id="9" name="Straight Arrow Connector 8"/>
+          <p:cNvCxnSpPr/>
+          <p:nvPr/>
+        </p:nvCxnSpPr>
+        <p:spPr>
+          <a:xfrm>
+            <a:off x="3599307" y="4419600"/>
+            <a:ext cx="381000" cy="381000"/>
+          </a:xfrm>
+          <a:prstGeom prst="straightConnector1">
+            <a:avLst/>
+          </a:prstGeom>
+          <a:ln w="38100">
+            <a:tailEnd type="arrow"/>
+          </a:ln>
+        </p:spPr>
+        <p:style>
+          <a:lnRef idx="1">
+            <a:schemeClr val="accent1"/>
+          </a:lnRef>
+          <a:fillRef idx="0">
+            <a:schemeClr val="accent1"/>
+          </a:fillRef>
+          <a:effectRef idx="0">
+            <a:schemeClr val="accent1"/>
+          </a:effectRef>
+          <a:fontRef idx="minor">
+            <a:schemeClr val="tx1"/>
+          </a:fontRef>
+        </p:style>
+      </p:cxnSp>
+      <p:sp>
+        <p:nvSpPr>
+          <p:cNvPr id="7" name="TextBox 6"/>
+          <p:cNvSpPr txBox="1"/>
+          <p:nvPr/>
+        </p:nvSpPr>
+        <p:spPr>
+          <a:xfrm>
+            <a:off x="304800" y="1254300"/>
+            <a:ext cx="1295400" cy="646331"/>
+          </a:xfrm>
+          <a:prstGeom prst="rect">
+            <a:avLst/>
+          </a:prstGeom>
+          <a:noFill/>
+        </p:spPr>
+        <p:txBody>
+          <a:bodyPr wrap="square" rtlCol="0">
+            <a:spAutoFit/>
+          </a:bodyPr>
+          <a:lstStyle/>
+          <a:p>
+            <a:r>
+              <a:rPr lang="en-US" dirty="0" smtClean="0"/>
+              <a:t>Branch</a:t>
+            </a:r>
+          </a:p>
+          <a:p>
+            <a:r>
+              <a:rPr lang="en-US" dirty="0" smtClean="0"/>
+              <a:t>“master”</a:t>
+            </a:r>
+            <a:endParaRPr lang="en-US" dirty="0"/>
+          </a:p>
+        </p:txBody>
+      </p:sp>
+      <p:pic>
+        <p:nvPicPr>
+          <p:cNvPr id="13" name="Picture 2"/>
+          <p:cNvPicPr>
+            <a:picLocks noChangeAspect="1" noChangeArrowheads="1"/>
+          </p:cNvPicPr>
+          <p:nvPr/>
+        </p:nvPicPr>
+        <p:blipFill>
+          <a:blip r:embed="rId2">
+            <a:extLst>
+              <a:ext uri="{28A0092B-C50C-407E-A947-70E740481C1C}">
+                <a14:useLocalDpi xmlns:a14="http://schemas.microsoft.com/office/drawing/2010/main" val="0"/>
+              </a:ext>
+            </a:extLst>
+          </a:blip>
+          <a:srcRect/>
+          <a:stretch>
+            <a:fillRect/>
+          </a:stretch>
+        </p:blipFill>
+        <p:spPr bwMode="auto">
+          <a:xfrm>
+            <a:off x="5143500" y="753237"/>
+            <a:ext cx="1866900" cy="1438275"/>
+          </a:xfrm>
+          <a:prstGeom prst="rect">
+            <a:avLst/>
+          </a:prstGeom>
+          <a:noFill/>
+          <a:ln>
+            <a:noFill/>
+          </a:ln>
+          <a:extLst>
+            <a:ext uri="{909E8E84-426E-40DD-AFC4-6F175D3DCCD1}">
+              <a14:hiddenFill xmlns:a14="http://schemas.microsoft.com/office/drawing/2010/main">
+                <a:solidFill>
+                  <a:schemeClr val="accent1"/>
+                </a:solidFill>
+              </a14:hiddenFill>
+            </a:ext>
+            <a:ext uri="{91240B29-F687-4F45-9708-019B960494DF}">
+              <a14:hiddenLine xmlns:a14="http://schemas.microsoft.com/office/drawing/2010/main" w="9525">
+                <a:solidFill>
+                  <a:schemeClr val="tx1"/>
+                </a:solidFill>
+                <a:miter lim="800000"/>
+                <a:headEnd/>
+                <a:tailEnd/>
+              </a14:hiddenLine>
+            </a:ext>
+          </a:extLst>
+        </p:spPr>
+      </p:pic>
+      <p:sp>
+        <p:nvSpPr>
+          <p:cNvPr id="11" name="Curved Down Arrow 10"/>
+          <p:cNvSpPr/>
+          <p:nvPr/>
+        </p:nvSpPr>
+        <p:spPr>
+          <a:xfrm>
+            <a:off x="3599307" y="533400"/>
+            <a:ext cx="1428750" cy="609600"/>
+          </a:xfrm>
+          <a:prstGeom prst="curvedDownArrow">
+            <a:avLst/>
+          </a:prstGeom>
+          <a:solidFill>
+            <a:srgbClr val="FF0000"/>
+          </a:solidFill>
+          <a:ln>
+            <a:noFill/>
+          </a:ln>
+        </p:spPr>
+        <p:style>
+          <a:lnRef idx="2">
+            <a:schemeClr val="accent1">
+              <a:shade val="50000"/>
+            </a:schemeClr>
+          </a:lnRef>
+          <a:fillRef idx="1">
+            <a:schemeClr val="accent1"/>
+          </a:fillRef>
+          <a:effectRef idx="0">
+            <a:schemeClr val="accent1"/>
+          </a:effectRef>
+          <a:fontRef idx="minor">
+            <a:schemeClr val="lt1"/>
+          </a:fontRef>
+        </p:style>
+        <p:txBody>
+          <a:bodyPr rtlCol="0" anchor="ctr"/>
+          <a:lstStyle/>
+          <a:p>
+            <a:pPr algn="ctr"/>
+            <a:endParaRPr lang="en-US">
+              <a:solidFill>
+                <a:srgbClr val="FF0000"/>
+              </a:solidFill>
+            </a:endParaRPr>
+          </a:p>
+        </p:txBody>
+      </p:sp>
+      <p:sp>
+        <p:nvSpPr>
+          <p:cNvPr id="17" name="TextBox 16"/>
+          <p:cNvSpPr txBox="1"/>
+          <p:nvPr/>
+        </p:nvSpPr>
+        <p:spPr>
+          <a:xfrm>
+            <a:off x="7239000" y="1115799"/>
+            <a:ext cx="1295400" cy="646331"/>
+          </a:xfrm>
+          <a:prstGeom prst="rect">
+            <a:avLst/>
+          </a:prstGeom>
+          <a:noFill/>
+        </p:spPr>
+        <p:txBody>
+          <a:bodyPr wrap="square" rtlCol="0">
+            <a:spAutoFit/>
+          </a:bodyPr>
+          <a:lstStyle/>
+          <a:p>
+            <a:r>
+              <a:rPr lang="en-US" dirty="0" smtClean="0"/>
+              <a:t>Branch</a:t>
+            </a:r>
+          </a:p>
+          <a:p>
+            <a:r>
+              <a:rPr lang="en-US" dirty="0" smtClean="0"/>
+              <a:t>“test”</a:t>
+            </a:r>
+            <a:endParaRPr lang="en-US" dirty="0"/>
+          </a:p>
+        </p:txBody>
+      </p:sp>
+      <p:sp>
+        <p:nvSpPr>
+          <p:cNvPr id="19" name="TextBox 18"/>
+          <p:cNvSpPr txBox="1"/>
+          <p:nvPr/>
+        </p:nvSpPr>
+        <p:spPr>
+          <a:xfrm>
+            <a:off x="3599307" y="76200"/>
+            <a:ext cx="1544193" cy="369332"/>
+          </a:xfrm>
+          <a:prstGeom prst="rect">
+            <a:avLst/>
+          </a:prstGeom>
+          <a:noFill/>
+        </p:spPr>
+        <p:txBody>
+          <a:bodyPr wrap="square" rtlCol="0">
+            <a:spAutoFit/>
+          </a:bodyPr>
+          <a:lstStyle/>
+          <a:p>
+            <a:r>
+              <a:rPr lang="en-US" dirty="0" smtClean="0"/>
+              <a:t>New branch</a:t>
+            </a:r>
+            <a:endParaRPr lang="en-US" dirty="0"/>
+          </a:p>
+        </p:txBody>
+      </p:sp>
+      <p:cxnSp>
+        <p:nvCxnSpPr>
+          <p:cNvPr id="20" name="Straight Arrow Connector 19"/>
+          <p:cNvCxnSpPr/>
+          <p:nvPr/>
+        </p:nvCxnSpPr>
+        <p:spPr>
+          <a:xfrm flipH="1">
+            <a:off x="4953000" y="4419600"/>
+            <a:ext cx="381000" cy="381000"/>
+          </a:xfrm>
+          <a:prstGeom prst="straightConnector1">
+            <a:avLst/>
+          </a:prstGeom>
+          <a:ln w="38100">
+            <a:tailEnd type="arrow"/>
+          </a:ln>
+        </p:spPr>
+        <p:style>
+          <a:lnRef idx="1">
+            <a:schemeClr val="accent1"/>
+          </a:lnRef>
+          <a:fillRef idx="0">
+            <a:schemeClr val="accent1"/>
+          </a:fillRef>
+          <a:effectRef idx="0">
+            <a:schemeClr val="accent1"/>
+          </a:effectRef>
+          <a:fontRef idx="minor">
+            <a:schemeClr val="tx1"/>
+          </a:fontRef>
+        </p:style>
+      </p:cxnSp>
+      <p:cxnSp>
+        <p:nvCxnSpPr>
+          <p:cNvPr id="22" name="Straight Arrow Connector 21"/>
+          <p:cNvCxnSpPr/>
+          <p:nvPr/>
+        </p:nvCxnSpPr>
+        <p:spPr>
+          <a:xfrm>
+            <a:off x="6067806" y="2272284"/>
+            <a:ext cx="0" cy="394716"/>
+          </a:xfrm>
+          <a:prstGeom prst="straightConnector1">
+            <a:avLst/>
+          </a:prstGeom>
+          <a:ln w="38100">
+            <a:tailEnd type="arrow"/>
+          </a:ln>
+        </p:spPr>
+        <p:style>
+          <a:lnRef idx="1">
+            <a:schemeClr val="accent1"/>
+          </a:lnRef>
+          <a:fillRef idx="0">
+            <a:schemeClr val="accent1"/>
+          </a:fillRef>
+          <a:effectRef idx="0">
+            <a:schemeClr val="accent1"/>
+          </a:effectRef>
+          <a:fontRef idx="minor">
+            <a:schemeClr val="tx1"/>
+          </a:fontRef>
+        </p:style>
+      </p:cxnSp>
+      <p:sp>
+        <p:nvSpPr>
+          <p:cNvPr id="25" name="TextBox 24"/>
+          <p:cNvSpPr txBox="1"/>
+          <p:nvPr/>
+        </p:nvSpPr>
+        <p:spPr>
+          <a:xfrm>
+            <a:off x="5726906" y="5410200"/>
+            <a:ext cx="2883694" cy="923330"/>
+          </a:xfrm>
+          <a:prstGeom prst="rect">
+            <a:avLst/>
+          </a:prstGeom>
+          <a:noFill/>
+          <a:ln>
+            <a:solidFill>
+              <a:schemeClr val="tx1"/>
+            </a:solidFill>
+          </a:ln>
+        </p:spPr>
+        <p:txBody>
+          <a:bodyPr wrap="square" rtlCol="0">
+            <a:spAutoFit/>
+          </a:bodyPr>
+          <a:lstStyle/>
+          <a:p>
+            <a:r>
+              <a:rPr lang="en-US" dirty="0" smtClean="0"/>
+              <a:t>Conflict markers are inserted</a:t>
+            </a:r>
+          </a:p>
+          <a:p>
+            <a:r>
+              <a:rPr lang="en-US" dirty="0" smtClean="0"/>
+              <a:t>Conflicts must be resolved manually before merging</a:t>
+            </a:r>
+            <a:endParaRPr lang="en-US" dirty="0"/>
+          </a:p>
+        </p:txBody>
+      </p:sp>
+      <p:pic>
+        <p:nvPicPr>
+          <p:cNvPr id="5122" name="Picture 2"/>
+          <p:cNvPicPr>
+            <a:picLocks noChangeAspect="1" noChangeArrowheads="1"/>
+          </p:cNvPicPr>
+          <p:nvPr/>
+        </p:nvPicPr>
+        <p:blipFill>
+          <a:blip r:embed="rId5">
+            <a:extLst>
+              <a:ext uri="{28A0092B-C50C-407E-A947-70E740481C1C}">
+                <a14:useLocalDpi xmlns:a14="http://schemas.microsoft.com/office/drawing/2010/main" val="0"/>
+              </a:ext>
+            </a:extLst>
+          </a:blip>
+          <a:srcRect/>
+          <a:stretch>
+            <a:fillRect/>
+          </a:stretch>
+        </p:blipFill>
+        <p:spPr bwMode="auto">
+          <a:xfrm>
+            <a:off x="3400425" y="4876800"/>
+            <a:ext cx="2114550" cy="1676400"/>
+          </a:xfrm>
+          <a:prstGeom prst="rect">
+            <a:avLst/>
+          </a:prstGeom>
+          <a:noFill/>
+          <a:ln>
+            <a:noFill/>
+          </a:ln>
+          <a:extLst>
+            <a:ext uri="{909E8E84-426E-40DD-AFC4-6F175D3DCCD1}">
+              <a14:hiddenFill xmlns:a14="http://schemas.microsoft.com/office/drawing/2010/main">
+                <a:solidFill>
+                  <a:schemeClr val="accent1"/>
+                </a:solidFill>
+              </a14:hiddenFill>
+            </a:ext>
+            <a:ext uri="{91240B29-F687-4F45-9708-019B960494DF}">
+              <a14:hiddenLine xmlns:a14="http://schemas.microsoft.com/office/drawing/2010/main" w="9525">
+                <a:solidFill>
+                  <a:schemeClr val="tx1"/>
+                </a:solidFill>
+                <a:miter lim="800000"/>
+                <a:headEnd/>
+                <a:tailEnd/>
+              </a14:hiddenLine>
+            </a:ext>
+          </a:extLst>
+        </p:spPr>
+      </p:pic>
+    </p:spTree>
+    <p:extLst>
+      <p:ext uri="{BB962C8B-B14F-4D97-AF65-F5344CB8AC3E}">
+        <p14:creationId xmlns:p14="http://schemas.microsoft.com/office/powerpoint/2010/main" val="1288532033"/>
+      </p:ext>
+    </p:extLst>
+  </p:cSld>
+  <p:clrMapOvr>
+    <a:masterClrMapping/>
+  </p:clrMapOvr>
 </p:sld>
 </file>
 

</xml_diff>

<commit_message>
v1.2 of doxygen templates and updated github guide
</commit_message>
<xml_diff>
--- a/Getting Started/Getting Started with Github.pptx
+++ b/Getting Started/Getting Started with Github.pptx
@@ -14,12 +14,12 @@
     <p:sldId id="259" r:id="rId8"/>
     <p:sldId id="260" r:id="rId9"/>
     <p:sldId id="262" r:id="rId10"/>
-    <p:sldId id="283" r:id="rId11"/>
+    <p:sldId id="315" r:id="rId11"/>
     <p:sldId id="265" r:id="rId12"/>
     <p:sldId id="266" r:id="rId13"/>
     <p:sldId id="267" r:id="rId14"/>
     <p:sldId id="270" r:id="rId15"/>
-    <p:sldId id="284" r:id="rId16"/>
+    <p:sldId id="316" r:id="rId16"/>
     <p:sldId id="271" r:id="rId17"/>
     <p:sldId id="272" r:id="rId18"/>
     <p:sldId id="273" r:id="rId19"/>
@@ -28,7 +28,7 @@
     <p:sldId id="276" r:id="rId22"/>
     <p:sldId id="277" r:id="rId23"/>
     <p:sldId id="278" r:id="rId24"/>
-    <p:sldId id="281" r:id="rId25"/>
+    <p:sldId id="317" r:id="rId25"/>
     <p:sldId id="286" r:id="rId26"/>
     <p:sldId id="287" r:id="rId27"/>
     <p:sldId id="288" r:id="rId28"/>
@@ -37,7 +37,7 @@
     <p:sldId id="291" r:id="rId31"/>
     <p:sldId id="292" r:id="rId32"/>
     <p:sldId id="294" r:id="rId33"/>
-    <p:sldId id="300" r:id="rId34"/>
+    <p:sldId id="318" r:id="rId34"/>
     <p:sldId id="295" r:id="rId35"/>
     <p:sldId id="296" r:id="rId36"/>
     <p:sldId id="297" r:id="rId37"/>
@@ -47,13 +47,12 @@
     <p:sldId id="307" r:id="rId41"/>
     <p:sldId id="308" r:id="rId42"/>
     <p:sldId id="313" r:id="rId43"/>
-    <p:sldId id="285" r:id="rId44"/>
-    <p:sldId id="264" r:id="rId45"/>
-    <p:sldId id="263" r:id="rId46"/>
-    <p:sldId id="309" r:id="rId47"/>
-    <p:sldId id="310" r:id="rId48"/>
-    <p:sldId id="311" r:id="rId49"/>
-    <p:sldId id="312" r:id="rId50"/>
+    <p:sldId id="264" r:id="rId44"/>
+    <p:sldId id="263" r:id="rId45"/>
+    <p:sldId id="309" r:id="rId46"/>
+    <p:sldId id="310" r:id="rId47"/>
+    <p:sldId id="311" r:id="rId48"/>
+    <p:sldId id="312" r:id="rId49"/>
   </p:sldIdLst>
   <p:sldSz cx="9144000" cy="6858000" type="screen4x3"/>
   <p:notesSz cx="6858000" cy="9144000"/>
@@ -3261,10 +3260,47 @@
           </a:p>
         </p:txBody>
       </p:sp>
+      <p:sp>
+        <p:nvSpPr>
+          <p:cNvPr id="3" name="Content Placeholder 2"/>
+          <p:cNvSpPr>
+            <a:spLocks noGrp="1"/>
+          </p:cNvSpPr>
+          <p:nvPr>
+            <p:ph idx="1"/>
+          </p:nvPr>
+        </p:nvSpPr>
+        <p:spPr/>
+        <p:txBody>
+          <a:bodyPr/>
+          <a:lstStyle/>
+          <a:p>
+            <a:r>
+              <a:rPr lang="en-US" b="1" dirty="0"/>
+              <a:t>Clone</a:t>
+            </a:r>
+            <a:r>
+              <a:rPr lang="en-US" dirty="0"/>
+              <a:t> – </a:t>
+            </a:r>
+            <a:r>
+              <a:rPr lang="en-US" dirty="0" smtClean="0"/>
+              <a:t>copy a public </a:t>
+            </a:r>
+            <a:r>
+              <a:rPr lang="en-US" dirty="0"/>
+              <a:t>repository into a local directory</a:t>
+            </a:r>
+          </a:p>
+          <a:p>
+            <a:endParaRPr lang="en-US" dirty="0"/>
+          </a:p>
+        </p:txBody>
+      </p:sp>
     </p:spTree>
     <p:extLst>
       <p:ext uri="{BB962C8B-B14F-4D97-AF65-F5344CB8AC3E}">
-        <p14:creationId xmlns:p14="http://schemas.microsoft.com/office/powerpoint/2010/main" val="1499290167"/>
+        <p14:creationId xmlns:p14="http://schemas.microsoft.com/office/powerpoint/2010/main" val="2089650001"/>
       </p:ext>
     </p:extLst>
   </p:cSld>
@@ -3900,15 +3936,65 @@
         </p:nvSpPr>
         <p:spPr/>
         <p:txBody>
-          <a:bodyPr>
-            <a:normAutofit/>
-          </a:bodyPr>
+          <a:bodyPr/>
           <a:lstStyle/>
           <a:p>
             <a:r>
               <a:rPr lang="en-US" dirty="0" smtClean="0"/>
               <a:t>Making Changes</a:t>
             </a:r>
+            <a:endParaRPr lang="en-US" dirty="0"/>
+          </a:p>
+        </p:txBody>
+      </p:sp>
+      <p:sp>
+        <p:nvSpPr>
+          <p:cNvPr id="3" name="Content Placeholder 2"/>
+          <p:cNvSpPr>
+            <a:spLocks noGrp="1"/>
+          </p:cNvSpPr>
+          <p:nvPr>
+            <p:ph idx="1"/>
+          </p:nvPr>
+        </p:nvSpPr>
+        <p:spPr/>
+        <p:txBody>
+          <a:bodyPr/>
+          <a:lstStyle/>
+          <a:p>
+            <a:r>
+              <a:rPr lang="en-US" b="1" dirty="0"/>
+              <a:t>Commit</a:t>
+            </a:r>
+            <a:r>
+              <a:rPr lang="en-US" dirty="0"/>
+              <a:t> – group changes to local files together with a brief description; preparation for sending back to public repository</a:t>
+            </a:r>
+          </a:p>
+          <a:p>
+            <a:r>
+              <a:rPr lang="en-US" b="1" dirty="0"/>
+              <a:t>Sync</a:t>
+            </a:r>
+            <a:r>
+              <a:rPr lang="en-US" dirty="0"/>
+              <a:t> – pull repository </a:t>
+            </a:r>
+            <a:r>
+              <a:rPr lang="en-US" dirty="0" smtClean="0"/>
+              <a:t>changes by other contributors </a:t>
+            </a:r>
+            <a:r>
+              <a:rPr lang="en-US" dirty="0"/>
+              <a:t>to existing local directory &amp; push a commit or a group of commits to the public </a:t>
+            </a:r>
+            <a:r>
+              <a:rPr lang="en-US" dirty="0" smtClean="0"/>
+              <a:t>repository for other contributors</a:t>
+            </a:r>
+            <a:endParaRPr lang="en-US" dirty="0"/>
+          </a:p>
+          <a:p>
             <a:endParaRPr lang="en-US" dirty="0"/>
           </a:p>
         </p:txBody>
@@ -3916,7 +4002,7 @@
     </p:spTree>
     <p:extLst>
       <p:ext uri="{BB962C8B-B14F-4D97-AF65-F5344CB8AC3E}">
-        <p14:creationId xmlns:p14="http://schemas.microsoft.com/office/powerpoint/2010/main" val="2477958169"/>
+        <p14:creationId xmlns:p14="http://schemas.microsoft.com/office/powerpoint/2010/main" val="2736977916"/>
       </p:ext>
     </p:extLst>
   </p:cSld>
@@ -5176,10 +5262,102 @@
           </a:p>
         </p:txBody>
       </p:sp>
+      <p:sp>
+        <p:nvSpPr>
+          <p:cNvPr id="3" name="Content Placeholder 2"/>
+          <p:cNvSpPr>
+            <a:spLocks noGrp="1"/>
+          </p:cNvSpPr>
+          <p:nvPr>
+            <p:ph idx="1"/>
+          </p:nvPr>
+        </p:nvSpPr>
+        <p:spPr/>
+        <p:txBody>
+          <a:bodyPr/>
+          <a:lstStyle/>
+          <a:p>
+            <a:r>
+              <a:rPr lang="en-US" b="1" dirty="0"/>
+              <a:t>B</a:t>
+            </a:r>
+            <a:r>
+              <a:rPr lang="en-US" b="1" dirty="0" smtClean="0"/>
+              <a:t>ranch</a:t>
+            </a:r>
+            <a:r>
+              <a:rPr lang="en-US" dirty="0" smtClean="0"/>
+              <a:t> – </a:t>
+            </a:r>
+            <a:r>
+              <a:rPr lang="en-US" dirty="0" smtClean="0"/>
+              <a:t>copy </a:t>
+            </a:r>
+            <a:r>
+              <a:rPr lang="en-US" dirty="0" smtClean="0"/>
+              <a:t>an existing repository into a new branch; usually to develop a new </a:t>
+            </a:r>
+            <a:r>
+              <a:rPr lang="en-US" dirty="0" smtClean="0"/>
+              <a:t>feature </a:t>
+            </a:r>
+            <a:r>
+              <a:rPr lang="en-US" dirty="0" smtClean="0"/>
+              <a:t>or work out a bug </a:t>
+            </a:r>
+            <a:r>
+              <a:rPr lang="en-US" dirty="0" smtClean="0"/>
+              <a:t>fix</a:t>
+            </a:r>
+            <a:endParaRPr lang="en-US" dirty="0" smtClean="0"/>
+          </a:p>
+        </p:txBody>
+      </p:sp>
+      <p:pic>
+        <p:nvPicPr>
+          <p:cNvPr id="36866" name="Picture 2" descr="https://encrypted-tbn1.gstatic.com/images?q=tbn:ANd9GcRA61O-k4NUXWQ5p-GDyeNEr6xmEes8XxH3GpB7SER9qoSrm29v"/>
+          <p:cNvPicPr>
+            <a:picLocks noChangeAspect="1" noChangeArrowheads="1"/>
+          </p:cNvPicPr>
+          <p:nvPr/>
+        </p:nvPicPr>
+        <p:blipFill>
+          <a:blip r:embed="rId2">
+            <a:extLst>
+              <a:ext uri="{28A0092B-C50C-407E-A947-70E740481C1C}">
+                <a14:useLocalDpi xmlns:a14="http://schemas.microsoft.com/office/drawing/2010/main" val="0"/>
+              </a:ext>
+            </a:extLst>
+          </a:blip>
+          <a:srcRect/>
+          <a:stretch>
+            <a:fillRect/>
+          </a:stretch>
+        </p:blipFill>
+        <p:spPr bwMode="auto">
+          <a:xfrm>
+            <a:off x="1295400" y="3657600"/>
+            <a:ext cx="6232069" cy="2181226"/>
+          </a:xfrm>
+          <a:prstGeom prst="rect">
+            <a:avLst/>
+          </a:prstGeom>
+          <a:noFill/>
+          <a:extLst>
+            <a:ext uri="{909E8E84-426E-40DD-AFC4-6F175D3DCCD1}">
+              <a14:hiddenFill xmlns:a14="http://schemas.microsoft.com/office/drawing/2010/main">
+                <a:solidFill>
+                  <a:srgbClr val="FFFFFF"/>
+                </a:solidFill>
+              </a14:hiddenFill>
+            </a:ext>
+          </a:extLst>
+        </p:spPr>
+      </p:pic>
     </p:spTree>
     <p:extLst>
       <p:ext uri="{BB962C8B-B14F-4D97-AF65-F5344CB8AC3E}">
-        <p14:creationId xmlns:p14="http://schemas.microsoft.com/office/powerpoint/2010/main" val="3705461427"/>
+        <p14:creationId xmlns:p14="http://schemas.microsoft.com/office/powerpoint/2010/main" val="2002878448"/>
       </p:ext>
     </p:extLst>
   </p:cSld>
@@ -6324,10 +6502,90 @@
           </a:p>
         </p:txBody>
       </p:sp>
+      <p:sp>
+        <p:nvSpPr>
+          <p:cNvPr id="3" name="Content Placeholder 2"/>
+          <p:cNvSpPr>
+            <a:spLocks noGrp="1"/>
+          </p:cNvSpPr>
+          <p:nvPr>
+            <p:ph idx="1"/>
+          </p:nvPr>
+        </p:nvSpPr>
+        <p:spPr/>
+        <p:txBody>
+          <a:bodyPr/>
+          <a:lstStyle/>
+          <a:p>
+            <a:r>
+              <a:rPr lang="en-US" b="1" dirty="0" smtClean="0"/>
+              <a:t>Merge</a:t>
+            </a:r>
+            <a:r>
+              <a:rPr lang="en-US" dirty="0" smtClean="0"/>
+              <a:t> </a:t>
+            </a:r>
+            <a:r>
+              <a:rPr lang="en-US" dirty="0" smtClean="0"/>
+              <a:t>– </a:t>
+            </a:r>
+            <a:r>
+              <a:rPr lang="en-US" dirty="0" smtClean="0"/>
+              <a:t>combine </a:t>
+            </a:r>
+            <a:r>
+              <a:rPr lang="en-US" dirty="0" smtClean="0"/>
+              <a:t>two branches into one</a:t>
+            </a:r>
+            <a:endParaRPr lang="en-US" b="1" dirty="0" smtClean="0"/>
+          </a:p>
+        </p:txBody>
+      </p:sp>
+      <p:pic>
+        <p:nvPicPr>
+          <p:cNvPr id="36866" name="Picture 2" descr="https://encrypted-tbn1.gstatic.com/images?q=tbn:ANd9GcRA61O-k4NUXWQ5p-GDyeNEr6xmEes8XxH3GpB7SER9qoSrm29v"/>
+          <p:cNvPicPr>
+            <a:picLocks noChangeAspect="1" noChangeArrowheads="1"/>
+          </p:cNvPicPr>
+          <p:nvPr/>
+        </p:nvPicPr>
+        <p:blipFill>
+          <a:blip r:embed="rId2">
+            <a:extLst>
+              <a:ext uri="{28A0092B-C50C-407E-A947-70E740481C1C}">
+                <a14:useLocalDpi xmlns:a14="http://schemas.microsoft.com/office/drawing/2010/main" val="0"/>
+              </a:ext>
+            </a:extLst>
+          </a:blip>
+          <a:srcRect/>
+          <a:stretch>
+            <a:fillRect/>
+          </a:stretch>
+        </p:blipFill>
+        <p:spPr bwMode="auto">
+          <a:xfrm>
+            <a:off x="1295400" y="3429000"/>
+            <a:ext cx="6232069" cy="2181226"/>
+          </a:xfrm>
+          <a:prstGeom prst="rect">
+            <a:avLst/>
+          </a:prstGeom>
+          <a:noFill/>
+          <a:extLst>
+            <a:ext uri="{909E8E84-426E-40DD-AFC4-6F175D3DCCD1}">
+              <a14:hiddenFill xmlns:a14="http://schemas.microsoft.com/office/drawing/2010/main">
+                <a:solidFill>
+                  <a:srgbClr val="FFFFFF"/>
+                </a:solidFill>
+              </a14:hiddenFill>
+            </a:ext>
+          </a:extLst>
+        </p:spPr>
+      </p:pic>
     </p:spTree>
     <p:extLst>
       <p:ext uri="{BB962C8B-B14F-4D97-AF65-F5344CB8AC3E}">
-        <p14:creationId xmlns:p14="http://schemas.microsoft.com/office/powerpoint/2010/main" val="3223226657"/>
+        <p14:creationId xmlns:p14="http://schemas.microsoft.com/office/powerpoint/2010/main" val="2002878448"/>
       </p:ext>
     </p:extLst>
   </p:cSld>
@@ -7040,31 +7298,7 @@
                   <a:schemeClr val="bg1"/>
                 </a:solidFill>
               </a:rPr>
-              <a:t>…will </a:t>
-            </a:r>
-            <a:r>
-              <a:rPr lang="en-US" dirty="0" smtClean="0">
-                <a:solidFill>
-                  <a:schemeClr val="bg1"/>
-                </a:solidFill>
-              </a:rPr>
-              <a:t>merge with files </a:t>
-            </a:r>
-            <a:r>
-              <a:rPr lang="en-US" dirty="0" smtClean="0">
-                <a:solidFill>
-                  <a:schemeClr val="bg1"/>
-                </a:solidFill>
-              </a:rPr>
-              <a:t>in </a:t>
-            </a:r>
-            <a:r>
-              <a:rPr lang="en-US" dirty="0" smtClean="0">
-                <a:solidFill>
-                  <a:schemeClr val="bg1"/>
-                </a:solidFill>
-              </a:rPr>
-              <a:t>this one</a:t>
+              <a:t>…will merge with files in this one</a:t>
             </a:r>
             <a:endParaRPr lang="en-US" dirty="0">
               <a:solidFill>
@@ -7663,9 +7897,16 @@
             <p:ph idx="1"/>
           </p:nvPr>
         </p:nvSpPr>
-        <p:spPr/>
-        <p:txBody>
-          <a:bodyPr/>
+        <p:spPr>
+          <a:xfrm>
+            <a:off x="457200" y="1600200"/>
+            <a:ext cx="8229600" cy="4953000"/>
+          </a:xfrm>
+        </p:spPr>
+        <p:txBody>
+          <a:bodyPr>
+            <a:normAutofit/>
+          </a:bodyPr>
           <a:lstStyle/>
           <a:p>
             <a:r>
@@ -7674,28 +7915,35 @@
             </a:r>
             <a:r>
               <a:rPr lang="en-US" dirty="0" smtClean="0"/>
-              <a:t> – clones a repository into a local directory</a:t>
-            </a:r>
-          </a:p>
-          <a:p>
-            <a:r>
-              <a:rPr lang="en-US" b="1" dirty="0" smtClean="0"/>
+              <a:t> – </a:t>
+            </a:r>
+            <a:r>
+              <a:rPr lang="en-US" dirty="0"/>
+              <a:t>copy a public repository into a local directory</a:t>
+            </a:r>
+          </a:p>
+          <a:p>
+            <a:r>
+              <a:rPr lang="en-US" b="1" dirty="0"/>
               <a:t>Commit</a:t>
             </a:r>
             <a:r>
-              <a:rPr lang="en-US" dirty="0" smtClean="0"/>
-              <a:t> – groups changes to local files together with a brief description; preparation for sending back to public repository</a:t>
-            </a:r>
-          </a:p>
-          <a:p>
-            <a:r>
-              <a:rPr lang="en-US" b="1" dirty="0" smtClean="0"/>
+              <a:rPr lang="en-US" dirty="0"/>
+              <a:t> – group changes to local files together with a brief description; preparation for sending back to public repository</a:t>
+            </a:r>
+          </a:p>
+          <a:p>
+            <a:r>
+              <a:rPr lang="en-US" b="1" dirty="0"/>
               <a:t>Sync</a:t>
             </a:r>
             <a:r>
-              <a:rPr lang="en-US" dirty="0" smtClean="0"/>
-              <a:t> – pulls repository changes to existing local directory &amp; pushes a commit or a group of commits to the public repository</a:t>
-            </a:r>
+              <a:rPr lang="en-US" dirty="0"/>
+              <a:t> – pull repository changes by other contributors to existing local directory &amp; push a commit or a group of commits to the public repository for other contributors</a:t>
+            </a:r>
+          </a:p>
+          <a:p>
+            <a:endParaRPr lang="en-US" dirty="0"/>
           </a:p>
           <a:p>
             <a:endParaRPr lang="en-US" dirty="0"/>
@@ -7787,7 +8035,15 @@
             </a:r>
             <a:r>
               <a:rPr lang="en-US" dirty="0" smtClean="0"/>
-              <a:t> – copies an existing repository into a new branch; usually to develop a new line of thought or work out a bug fix</a:t>
+              <a:t> – </a:t>
+            </a:r>
+            <a:r>
+              <a:rPr lang="en-US" dirty="0" smtClean="0"/>
+              <a:t>copy </a:t>
+            </a:r>
+            <a:r>
+              <a:rPr lang="en-US" dirty="0" smtClean="0"/>
+              <a:t>an existing repository into a new branch; usually to develop a new line of thought or work out a bug fix</a:t>
             </a:r>
           </a:p>
           <a:p>
@@ -7797,7 +8053,15 @@
             </a:r>
             <a:r>
               <a:rPr lang="en-US" dirty="0" smtClean="0"/>
-              <a:t> – combines two branches into one</a:t>
+              <a:t> – </a:t>
+            </a:r>
+            <a:r>
+              <a:rPr lang="en-US" dirty="0" smtClean="0"/>
+              <a:t>combine </a:t>
+            </a:r>
+            <a:r>
+              <a:rPr lang="en-US" dirty="0" smtClean="0"/>
+              <a:t>two branches into one</a:t>
             </a:r>
             <a:endParaRPr lang="en-US" b="1" dirty="0" smtClean="0"/>
           </a:p>
@@ -7936,85 +8200,13 @@
       </p:grpSpPr>
       <p:sp>
         <p:nvSpPr>
-          <p:cNvPr id="2" name="Title 1"/>
-          <p:cNvSpPr>
-            <a:spLocks noGrp="1"/>
-          </p:cNvSpPr>
-          <p:nvPr>
-            <p:ph type="title"/>
-          </p:nvPr>
-        </p:nvSpPr>
-        <p:spPr/>
-        <p:txBody>
-          <a:bodyPr/>
-          <a:lstStyle/>
-          <a:p>
-            <a:r>
-              <a:rPr lang="en-US" dirty="0" err="1" smtClean="0"/>
-              <a:t>Opensource</a:t>
-            </a:r>
-            <a:r>
-              <a:rPr lang="en-US" dirty="0" smtClean="0"/>
-              <a:t> Community </a:t>
-            </a:r>
-            <a:r>
-              <a:rPr lang="en-US" dirty="0"/>
-              <a:t>S</a:t>
-            </a:r>
-            <a:r>
-              <a:rPr lang="en-US" dirty="0" smtClean="0"/>
-              <a:t>tructure</a:t>
-            </a:r>
-            <a:endParaRPr lang="en-US" dirty="0"/>
-          </a:p>
-        </p:txBody>
-      </p:sp>
-    </p:spTree>
-    <p:extLst>
-      <p:ext uri="{BB962C8B-B14F-4D97-AF65-F5344CB8AC3E}">
-        <p14:creationId xmlns:p14="http://schemas.microsoft.com/office/powerpoint/2010/main" val="3411031204"/>
-      </p:ext>
-    </p:extLst>
-  </p:cSld>
-  <p:clrMapOvr>
-    <a:masterClrMapping/>
-  </p:clrMapOvr>
-  <p:timing>
-    <p:tnLst>
-      <p:par>
-        <p:cTn id="1" dur="indefinite" restart="never" nodeType="tmRoot"/>
-      </p:par>
-    </p:tnLst>
-  </p:timing>
-</p:sld>
-</file>
-
-<file path=ppt/slides/slide44.xml><?xml version="1.0" encoding="utf-8"?>
-<p:sld xmlns:a="http://schemas.openxmlformats.org/drawingml/2006/main" xmlns:r="http://schemas.openxmlformats.org/officeDocument/2006/relationships" xmlns:p="http://schemas.openxmlformats.org/presentationml/2006/main">
-  <p:cSld>
-    <p:spTree>
-      <p:nvGrpSpPr>
-        <p:cNvPr id="1" name=""/>
-        <p:cNvGrpSpPr/>
-        <p:nvPr/>
-      </p:nvGrpSpPr>
-      <p:grpSpPr>
-        <a:xfrm>
-          <a:off x="0" y="0"/>
-          <a:ext cx="0" cy="0"/>
-          <a:chOff x="0" y="0"/>
-          <a:chExt cx="0" cy="0"/>
-        </a:xfrm>
-      </p:grpSpPr>
-      <p:sp>
-        <p:nvSpPr>
           <p:cNvPr id="5" name="Oval 4"/>
           <p:cNvSpPr/>
           <p:nvPr/>
         </p:nvSpPr>
         <p:spPr>
           <a:xfrm>
-            <a:off x="2017776" y="762000"/>
+            <a:off x="2017776" y="1264920"/>
             <a:ext cx="5212080" cy="5212080"/>
           </a:xfrm>
           <a:prstGeom prst="ellipse">
@@ -8072,7 +8264,7 @@
         </p:nvSpPr>
         <p:spPr>
           <a:xfrm>
-            <a:off x="2590800" y="1371600"/>
+            <a:off x="2590800" y="1874520"/>
             <a:ext cx="4038600" cy="4038600"/>
           </a:xfrm>
           <a:prstGeom prst="ellipse">
@@ -8129,7 +8321,7 @@
         </p:nvSpPr>
         <p:spPr>
           <a:xfrm>
-            <a:off x="3291840" y="2148840"/>
+            <a:off x="3291840" y="2651760"/>
             <a:ext cx="2560320" cy="2560320"/>
           </a:xfrm>
           <a:prstGeom prst="ellipse">
@@ -8186,7 +8378,7 @@
         </p:nvSpPr>
         <p:spPr>
           <a:xfrm>
-            <a:off x="3477312" y="3741003"/>
+            <a:off x="3477312" y="4243923"/>
             <a:ext cx="2265575" cy="830997"/>
           </a:xfrm>
           <a:prstGeom prst="rect">
@@ -8382,7 +8574,7 @@
         </p:nvSpPr>
         <p:spPr>
           <a:xfrm>
-            <a:off x="2819400" y="1795820"/>
+            <a:off x="2819400" y="2298740"/>
             <a:ext cx="3733800" cy="871180"/>
           </a:xfrm>
           <a:prstGeom prst="round2SameRect">
@@ -8523,7 +8715,7 @@
         </p:nvSpPr>
         <p:spPr>
           <a:xfrm>
-            <a:off x="2819400" y="1066800"/>
+            <a:off x="2819400" y="1569720"/>
             <a:ext cx="3733800" cy="871180"/>
           </a:xfrm>
           <a:prstGeom prst="round2SameRect">
@@ -8656,6 +8848,46 @@
           </a:p>
         </p:txBody>
       </p:sp>
+      <p:sp>
+        <p:nvSpPr>
+          <p:cNvPr id="8" name="Title 1"/>
+          <p:cNvSpPr>
+            <a:spLocks noGrp="1"/>
+          </p:cNvSpPr>
+          <p:nvPr>
+            <p:ph type="title"/>
+          </p:nvPr>
+        </p:nvSpPr>
+        <p:spPr>
+          <a:xfrm>
+            <a:off x="457200" y="76200"/>
+            <a:ext cx="8229600" cy="1143000"/>
+          </a:xfrm>
+        </p:spPr>
+        <p:txBody>
+          <a:bodyPr/>
+          <a:lstStyle/>
+          <a:p>
+            <a:r>
+              <a:rPr lang="en-US" dirty="0" err="1" smtClean="0"/>
+              <a:t>Opensource</a:t>
+            </a:r>
+            <a:r>
+              <a:rPr lang="en-US" dirty="0" smtClean="0"/>
+              <a:t> Community </a:t>
+            </a:r>
+            <a:r>
+              <a:rPr lang="en-US" dirty="0"/>
+              <a:t>S</a:t>
+            </a:r>
+            <a:r>
+              <a:rPr lang="en-US" dirty="0" smtClean="0"/>
+              <a:t>tructure</a:t>
+            </a:r>
+            <a:endParaRPr lang="en-US" dirty="0"/>
+          </a:p>
+        </p:txBody>
+      </p:sp>
     </p:spTree>
     <p:extLst>
       <p:ext uri="{BB962C8B-B14F-4D97-AF65-F5344CB8AC3E}">
@@ -8676,7 +8908,7 @@
 </p:sld>
 </file>
 
-<file path=ppt/slides/slide45.xml><?xml version="1.0" encoding="utf-8"?>
+<file path=ppt/slides/slide44.xml><?xml version="1.0" encoding="utf-8"?>
 <p:sld xmlns:a="http://schemas.openxmlformats.org/drawingml/2006/main" xmlns:r="http://schemas.openxmlformats.org/officeDocument/2006/relationships" xmlns:p="http://schemas.openxmlformats.org/presentationml/2006/main">
   <p:cSld>
     <p:spTree>
@@ -8930,7 +9162,7 @@
 </p:sld>
 </file>
 
-<file path=ppt/slides/slide46.xml><?xml version="1.0" encoding="utf-8"?>
+<file path=ppt/slides/slide45.xml><?xml version="1.0" encoding="utf-8"?>
 <p:sld xmlns:a="http://schemas.openxmlformats.org/drawingml/2006/main" xmlns:r="http://schemas.openxmlformats.org/officeDocument/2006/relationships" xmlns:p="http://schemas.openxmlformats.org/presentationml/2006/main">
   <p:cSld>
     <p:spTree>
@@ -8985,7 +9217,7 @@
 </p:sld>
 </file>
 
-<file path=ppt/slides/slide47.xml><?xml version="1.0" encoding="utf-8"?>
+<file path=ppt/slides/slide46.xml><?xml version="1.0" encoding="utf-8"?>
 <p:sld xmlns:a="http://schemas.openxmlformats.org/drawingml/2006/main" xmlns:r="http://schemas.openxmlformats.org/officeDocument/2006/relationships" xmlns:p="http://schemas.openxmlformats.org/presentationml/2006/main">
   <p:cSld>
     <p:spTree>
@@ -9640,7 +9872,7 @@
 </p:sld>
 </file>
 
-<file path=ppt/slides/slide48.xml><?xml version="1.0" encoding="utf-8"?>
+<file path=ppt/slides/slide47.xml><?xml version="1.0" encoding="utf-8"?>
 <p:sld xmlns:a="http://schemas.openxmlformats.org/drawingml/2006/main" xmlns:r="http://schemas.openxmlformats.org/officeDocument/2006/relationships" xmlns:p="http://schemas.openxmlformats.org/presentationml/2006/main">
   <p:cSld>
     <p:spTree>
@@ -9762,7 +9994,7 @@
 </p:sld>
 </file>
 
-<file path=ppt/slides/slide49.xml><?xml version="1.0" encoding="utf-8"?>
+<file path=ppt/slides/slide48.xml><?xml version="1.0" encoding="utf-8"?>
 <p:sld xmlns:a="http://schemas.openxmlformats.org/drawingml/2006/main" xmlns:r="http://schemas.openxmlformats.org/officeDocument/2006/relationships" xmlns:p="http://schemas.openxmlformats.org/presentationml/2006/main">
   <p:cSld>
     <p:spTree>

</xml_diff>